<commit_message>
lavoro in ufficio 18 12 2023
</commit_message>
<xml_diff>
--- a/Pres.pptx
+++ b/Pres.pptx
@@ -9,13 +9,21 @@
     <p:sldId id="263" r:id="rId3"/>
     <p:sldId id="265" r:id="rId4"/>
     <p:sldId id="267" r:id="rId5"/>
-    <p:sldId id="266" r:id="rId6"/>
-    <p:sldId id="258" r:id="rId7"/>
-    <p:sldId id="259" r:id="rId8"/>
-    <p:sldId id="261" r:id="rId9"/>
-    <p:sldId id="260" r:id="rId10"/>
-    <p:sldId id="262" r:id="rId11"/>
-    <p:sldId id="257" r:id="rId12"/>
+    <p:sldId id="276" r:id="rId6"/>
+    <p:sldId id="279" r:id="rId7"/>
+    <p:sldId id="278" r:id="rId8"/>
+    <p:sldId id="277" r:id="rId9"/>
+    <p:sldId id="269" r:id="rId10"/>
+    <p:sldId id="281" r:id="rId11"/>
+    <p:sldId id="280" r:id="rId12"/>
+    <p:sldId id="270" r:id="rId13"/>
+    <p:sldId id="283" r:id="rId14"/>
+    <p:sldId id="271" r:id="rId15"/>
+    <p:sldId id="284" r:id="rId16"/>
+    <p:sldId id="272" r:id="rId17"/>
+    <p:sldId id="282" r:id="rId18"/>
+    <p:sldId id="273" r:id="rId19"/>
+    <p:sldId id="274" r:id="rId20"/>
   </p:sldIdLst>
   <p:sldSz cx="12192000" cy="6858000"/>
   <p:notesSz cx="6858000" cy="9144000"/>
@@ -269,7 +277,7 @@
           <a:p>
             <a:fld id="{F6E39AC5-7989-4FB1-86F7-C4BA2D20A357}" type="datetimeFigureOut">
               <a:rPr lang="it-IT" smtClean="0"/>
-              <a:t>16/12/2023</a:t>
+              <a:t>18/12/2023</a:t>
             </a:fld>
             <a:endParaRPr lang="it-IT"/>
           </a:p>
@@ -467,7 +475,7 @@
           <a:p>
             <a:fld id="{F6E39AC5-7989-4FB1-86F7-C4BA2D20A357}" type="datetimeFigureOut">
               <a:rPr lang="it-IT" smtClean="0"/>
-              <a:t>16/12/2023</a:t>
+              <a:t>18/12/2023</a:t>
             </a:fld>
             <a:endParaRPr lang="it-IT"/>
           </a:p>
@@ -675,7 +683,7 @@
           <a:p>
             <a:fld id="{F6E39AC5-7989-4FB1-86F7-C4BA2D20A357}" type="datetimeFigureOut">
               <a:rPr lang="it-IT" smtClean="0"/>
-              <a:t>16/12/2023</a:t>
+              <a:t>18/12/2023</a:t>
             </a:fld>
             <a:endParaRPr lang="it-IT"/>
           </a:p>
@@ -873,7 +881,7 @@
           <a:p>
             <a:fld id="{F6E39AC5-7989-4FB1-86F7-C4BA2D20A357}" type="datetimeFigureOut">
               <a:rPr lang="it-IT" smtClean="0"/>
-              <a:t>16/12/2023</a:t>
+              <a:t>18/12/2023</a:t>
             </a:fld>
             <a:endParaRPr lang="it-IT"/>
           </a:p>
@@ -1148,7 +1156,7 @@
           <a:p>
             <a:fld id="{F6E39AC5-7989-4FB1-86F7-C4BA2D20A357}" type="datetimeFigureOut">
               <a:rPr lang="it-IT" smtClean="0"/>
-              <a:t>16/12/2023</a:t>
+              <a:t>18/12/2023</a:t>
             </a:fld>
             <a:endParaRPr lang="it-IT"/>
           </a:p>
@@ -1413,7 +1421,7 @@
           <a:p>
             <a:fld id="{F6E39AC5-7989-4FB1-86F7-C4BA2D20A357}" type="datetimeFigureOut">
               <a:rPr lang="it-IT" smtClean="0"/>
-              <a:t>16/12/2023</a:t>
+              <a:t>18/12/2023</a:t>
             </a:fld>
             <a:endParaRPr lang="it-IT"/>
           </a:p>
@@ -1825,7 +1833,7 @@
           <a:p>
             <a:fld id="{F6E39AC5-7989-4FB1-86F7-C4BA2D20A357}" type="datetimeFigureOut">
               <a:rPr lang="it-IT" smtClean="0"/>
-              <a:t>16/12/2023</a:t>
+              <a:t>18/12/2023</a:t>
             </a:fld>
             <a:endParaRPr lang="it-IT"/>
           </a:p>
@@ -1966,7 +1974,7 @@
           <a:p>
             <a:fld id="{F6E39AC5-7989-4FB1-86F7-C4BA2D20A357}" type="datetimeFigureOut">
               <a:rPr lang="it-IT" smtClean="0"/>
-              <a:t>16/12/2023</a:t>
+              <a:t>18/12/2023</a:t>
             </a:fld>
             <a:endParaRPr lang="it-IT"/>
           </a:p>
@@ -2079,7 +2087,7 @@
           <a:p>
             <a:fld id="{F6E39AC5-7989-4FB1-86F7-C4BA2D20A357}" type="datetimeFigureOut">
               <a:rPr lang="it-IT" smtClean="0"/>
-              <a:t>16/12/2023</a:t>
+              <a:t>18/12/2023</a:t>
             </a:fld>
             <a:endParaRPr lang="it-IT"/>
           </a:p>
@@ -2390,7 +2398,7 @@
           <a:p>
             <a:fld id="{F6E39AC5-7989-4FB1-86F7-C4BA2D20A357}" type="datetimeFigureOut">
               <a:rPr lang="it-IT" smtClean="0"/>
-              <a:t>16/12/2023</a:t>
+              <a:t>18/12/2023</a:t>
             </a:fld>
             <a:endParaRPr lang="it-IT"/>
           </a:p>
@@ -2678,7 +2686,7 @@
           <a:p>
             <a:fld id="{F6E39AC5-7989-4FB1-86F7-C4BA2D20A357}" type="datetimeFigureOut">
               <a:rPr lang="it-IT" smtClean="0"/>
-              <a:t>16/12/2023</a:t>
+              <a:t>18/12/2023</a:t>
             </a:fld>
             <a:endParaRPr lang="it-IT"/>
           </a:p>
@@ -2919,7 +2927,7 @@
           <a:p>
             <a:fld id="{F6E39AC5-7989-4FB1-86F7-C4BA2D20A357}" type="datetimeFigureOut">
               <a:rPr lang="it-IT" smtClean="0"/>
-              <a:t>16/12/2023</a:t>
+              <a:t>18/12/2023</a:t>
             </a:fld>
             <a:endParaRPr lang="it-IT"/>
           </a:p>
@@ -3354,35 +3362,67 @@
         </p:nvSpPr>
         <p:spPr/>
         <p:txBody>
+          <a:bodyPr>
+            <a:normAutofit/>
+          </a:bodyPr>
+          <a:lstStyle/>
+          <a:p>
+            <a:r>
+              <a:rPr lang="it-IT" sz="4400" dirty="0"/>
+              <a:t>Pianificazione spaziale per la conservazione con </a:t>
+            </a:r>
+            <a:r>
+              <a:rPr lang="it-IT" sz="4400" cap="small" dirty="0"/>
+              <a:t>Prioritizr</a:t>
+            </a:r>
+            <a:br>
+              <a:rPr lang="it-IT" sz="4400" dirty="0"/>
+            </a:br>
+            <a:r>
+              <a:rPr lang="it-IT" sz="3600" dirty="0"/>
+              <a:t>Esempi di applicazioni</a:t>
+            </a:r>
+            <a:endParaRPr lang="it-IT" sz="4400" dirty="0"/>
+          </a:p>
+        </p:txBody>
+      </p:sp>
+      <p:sp>
+        <p:nvSpPr>
+          <p:cNvPr id="3" name="Sottotitolo 2">
+            <a:extLst>
+              <a:ext uri="{FF2B5EF4-FFF2-40B4-BE49-F238E27FC236}">
+                <a16:creationId xmlns:a16="http://schemas.microsoft.com/office/drawing/2014/main" id="{B646F838-29BD-9849-7020-AB7E96A8F89E}"/>
+              </a:ext>
+            </a:extLst>
+          </p:cNvPr>
+          <p:cNvSpPr>
+            <a:spLocks noGrp="1"/>
+          </p:cNvSpPr>
+          <p:nvPr>
+            <p:ph type="subTitle" idx="1"/>
+          </p:nvPr>
+        </p:nvSpPr>
+        <p:spPr>
+          <a:xfrm>
+            <a:off x="2405849" y="4767308"/>
+            <a:ext cx="7501631" cy="1526959"/>
+          </a:xfrm>
+        </p:spPr>
+        <p:txBody>
           <a:bodyPr/>
           <a:lstStyle/>
           <a:p>
-            <a:endParaRPr lang="it-IT"/>
-          </a:p>
-        </p:txBody>
-      </p:sp>
-      <p:sp>
-        <p:nvSpPr>
-          <p:cNvPr id="3" name="Sottotitolo 2">
-            <a:extLst>
-              <a:ext uri="{FF2B5EF4-FFF2-40B4-BE49-F238E27FC236}">
-                <a16:creationId xmlns:a16="http://schemas.microsoft.com/office/drawing/2014/main" id="{B646F838-29BD-9849-7020-AB7E96A8F89E}"/>
-              </a:ext>
-            </a:extLst>
-          </p:cNvPr>
-          <p:cNvSpPr>
-            <a:spLocks noGrp="1"/>
-          </p:cNvSpPr>
-          <p:nvPr>
-            <p:ph type="subTitle" idx="1"/>
-          </p:nvPr>
-        </p:nvSpPr>
-        <p:spPr/>
-        <p:txBody>
-          <a:bodyPr/>
-          <a:lstStyle/>
-          <a:p>
-            <a:endParaRPr lang="it-IT"/>
+            <a:r>
+              <a:rPr lang="it-IT" dirty="0"/>
+              <a:t>Marco Andrello</a:t>
+            </a:r>
+            <a:br>
+              <a:rPr lang="it-IT" dirty="0"/>
+            </a:br>
+            <a:r>
+              <a:rPr lang="it-IT" dirty="0"/>
+              <a:t>Istituto per lo studio degli impatti antropici e sostenibilità in ambiente marino (IAS)</a:t>
+            </a:r>
           </a:p>
         </p:txBody>
       </p:sp>
@@ -3416,12 +3456,85 @@
           <a:chExt cx="0" cy="0"/>
         </a:xfrm>
       </p:grpSpPr>
+      <p:sp>
+        <p:nvSpPr>
+          <p:cNvPr id="3" name="Segnaposto contenuto 2">
+            <a:extLst>
+              <a:ext uri="{FF2B5EF4-FFF2-40B4-BE49-F238E27FC236}">
+                <a16:creationId xmlns:a16="http://schemas.microsoft.com/office/drawing/2014/main" id="{99D23324-316C-0525-9A6E-FE2073FEF1A5}"/>
+              </a:ext>
+            </a:extLst>
+          </p:cNvPr>
+          <p:cNvSpPr>
+            <a:spLocks noGrp="1"/>
+          </p:cNvSpPr>
+          <p:nvPr>
+            <p:ph idx="1"/>
+          </p:nvPr>
+        </p:nvSpPr>
+        <p:spPr>
+          <a:xfrm>
+            <a:off x="838200" y="372862"/>
+            <a:ext cx="10515600" cy="2737983"/>
+          </a:xfrm>
+        </p:spPr>
+        <p:txBody>
+          <a:bodyPr>
+            <a:normAutofit lnSpcReduction="10000"/>
+          </a:bodyPr>
+          <a:lstStyle/>
+          <a:p>
+            <a:r>
+              <a:rPr lang="it-IT" dirty="0"/>
+              <a:t>Obiettivo: minimizzare costo totale di conservazione («minimum set» </a:t>
+            </a:r>
+            <a:r>
+              <a:rPr lang="it-IT" dirty="0" err="1"/>
+              <a:t>problem</a:t>
+            </a:r>
+            <a:r>
+              <a:rPr lang="it-IT" dirty="0"/>
+              <a:t>)</a:t>
+            </a:r>
+          </a:p>
+          <a:p>
+            <a:r>
+              <a:rPr lang="it-IT" dirty="0"/>
+              <a:t>Vincoli: includere almeno una porzione minima (</a:t>
+            </a:r>
+            <a:r>
+              <a:rPr lang="it-IT" i="1" dirty="0"/>
+              <a:t>target</a:t>
+            </a:r>
+            <a:r>
+              <a:rPr lang="it-IT" dirty="0"/>
+              <a:t>) dell’areale di presenza di ogni specie:</a:t>
+            </a:r>
+          </a:p>
+          <a:p>
+            <a:pPr lvl="1"/>
+            <a:r>
+              <a:rPr lang="it-IT" dirty="0"/>
+              <a:t>target unico = 20%</a:t>
+            </a:r>
+          </a:p>
+          <a:p>
+            <a:pPr marL="457200" lvl="1" indent="0">
+              <a:buNone/>
+            </a:pPr>
+            <a:br>
+              <a:rPr lang="it-IT" dirty="0"/>
+            </a:br>
+            <a:endParaRPr lang="it-IT" dirty="0"/>
+          </a:p>
+        </p:txBody>
+      </p:sp>
       <p:pic>
         <p:nvPicPr>
-          <p:cNvPr id="4" name="Immagine 3">
-            <a:extLst>
-              <a:ext uri="{FF2B5EF4-FFF2-40B4-BE49-F238E27FC236}">
-                <a16:creationId xmlns:a16="http://schemas.microsoft.com/office/drawing/2014/main" id="{C2AE10BF-4D0E-7EBF-E19C-605788DF2949}"/>
+          <p:cNvPr id="5" name="Immagine 4">
+            <a:extLst>
+              <a:ext uri="{FF2B5EF4-FFF2-40B4-BE49-F238E27FC236}">
+                <a16:creationId xmlns:a16="http://schemas.microsoft.com/office/drawing/2014/main" id="{8774788C-4CB1-DF88-A80A-C81EDEE858A3}"/>
               </a:ext>
             </a:extLst>
           </p:cNvPr>
@@ -3430,26 +3543,80 @@
           </p:cNvPicPr>
           <p:nvPr/>
         </p:nvPicPr>
-        <p:blipFill>
+        <p:blipFill rotWithShape="1">
           <a:blip r:embed="rId2"/>
-          <a:stretch>
-            <a:fillRect/>
-          </a:stretch>
+          <a:srcRect r="20797"/>
+          <a:stretch/>
         </p:blipFill>
         <p:spPr>
           <a:xfrm>
-            <a:off x="2938462" y="804862"/>
-            <a:ext cx="6315075" cy="5248275"/>
+            <a:off x="568925" y="2809188"/>
+            <a:ext cx="3739126" cy="3017706"/>
           </a:xfrm>
           <a:prstGeom prst="rect">
             <a:avLst/>
           </a:prstGeom>
         </p:spPr>
       </p:pic>
+      <p:sp>
+        <p:nvSpPr>
+          <p:cNvPr id="14" name="CasellaDiTesto 13">
+            <a:extLst>
+              <a:ext uri="{FF2B5EF4-FFF2-40B4-BE49-F238E27FC236}">
+                <a16:creationId xmlns:a16="http://schemas.microsoft.com/office/drawing/2014/main" id="{35CCC1B5-DF6E-DC27-BD7C-C9DA8DED1B55}"/>
+              </a:ext>
+            </a:extLst>
+          </p:cNvPr>
+          <p:cNvSpPr txBox="1"/>
+          <p:nvPr/>
+        </p:nvSpPr>
+        <p:spPr>
+          <a:xfrm>
+            <a:off x="584724" y="5723199"/>
+            <a:ext cx="2239139" cy="923330"/>
+          </a:xfrm>
+          <a:prstGeom prst="rect">
+            <a:avLst/>
+          </a:prstGeom>
+          <a:noFill/>
+        </p:spPr>
+        <p:txBody>
+          <a:bodyPr wrap="none" rtlCol="0">
+            <a:spAutoFit/>
+          </a:bodyPr>
+          <a:lstStyle/>
+          <a:p>
+            <a:r>
+              <a:rPr lang="it-IT" dirty="0"/>
+              <a:t>Target unico</a:t>
+            </a:r>
+          </a:p>
+          <a:p>
+            <a:r>
+              <a:rPr lang="it-IT" dirty="0"/>
+              <a:t>370 </a:t>
+            </a:r>
+            <a:r>
+              <a:rPr lang="it-IT" dirty="0" err="1"/>
+              <a:t>PUs</a:t>
+            </a:r>
+            <a:r>
+              <a:rPr lang="it-IT" dirty="0"/>
+              <a:t> selezionate</a:t>
+            </a:r>
+          </a:p>
+          <a:p>
+            <a:r>
+              <a:rPr lang="it-IT" dirty="0"/>
+              <a:t>costo totale: 1399 M€</a:t>
+            </a:r>
+          </a:p>
+        </p:txBody>
+      </p:sp>
     </p:spTree>
     <p:extLst>
       <p:ext uri="{BB962C8B-B14F-4D97-AF65-F5344CB8AC3E}">
-        <p14:creationId xmlns:p14="http://schemas.microsoft.com/office/powerpoint/2010/main" val="3484768008"/>
+        <p14:creationId xmlns:p14="http://schemas.microsoft.com/office/powerpoint/2010/main" val="3198541904"/>
       </p:ext>
     </p:extLst>
   </p:cSld>
@@ -3478,90 +3645,204 @@
       </p:grpSpPr>
       <p:sp>
         <p:nvSpPr>
-          <p:cNvPr id="2" name="Titolo 1">
-            <a:extLst>
-              <a:ext uri="{FF2B5EF4-FFF2-40B4-BE49-F238E27FC236}">
-                <a16:creationId xmlns:a16="http://schemas.microsoft.com/office/drawing/2014/main" id="{BD33C833-47E1-6C2D-3EAA-7D58C966ECF9}"/>
-              </a:ext>
-            </a:extLst>
-          </p:cNvPr>
-          <p:cNvSpPr>
-            <a:spLocks noGrp="1"/>
-          </p:cNvSpPr>
-          <p:nvPr>
-            <p:ph type="title"/>
-          </p:nvPr>
-        </p:nvSpPr>
-        <p:spPr>
-          <a:xfrm>
-            <a:off x="838200" y="365126"/>
-            <a:ext cx="10515600" cy="794372"/>
-          </a:xfrm>
-        </p:spPr>
-        <p:txBody>
-          <a:bodyPr/>
-          <a:lstStyle/>
-          <a:p>
-            <a:r>
-              <a:rPr lang="it-IT" dirty="0"/>
-              <a:t>Basin-scale: </a:t>
+          <p:cNvPr id="3" name="Segnaposto contenuto 2">
+            <a:extLst>
+              <a:ext uri="{FF2B5EF4-FFF2-40B4-BE49-F238E27FC236}">
+                <a16:creationId xmlns:a16="http://schemas.microsoft.com/office/drawing/2014/main" id="{99D23324-316C-0525-9A6E-FE2073FEF1A5}"/>
+              </a:ext>
+            </a:extLst>
+          </p:cNvPr>
+          <p:cNvSpPr>
+            <a:spLocks noGrp="1"/>
+          </p:cNvSpPr>
+          <p:nvPr>
+            <p:ph idx="1"/>
+          </p:nvPr>
+        </p:nvSpPr>
+        <p:spPr>
+          <a:xfrm>
+            <a:off x="838200" y="372862"/>
+            <a:ext cx="10515600" cy="2737983"/>
+          </a:xfrm>
+        </p:spPr>
+        <p:txBody>
+          <a:bodyPr>
+            <a:normAutofit lnSpcReduction="10000"/>
+          </a:bodyPr>
+          <a:lstStyle/>
+          <a:p>
+            <a:r>
+              <a:rPr lang="it-IT" dirty="0"/>
+              <a:t>Obiettivo: minimizzare costo totale di conservazione («minimum set» </a:t>
             </a:r>
             <a:r>
               <a:rPr lang="it-IT" dirty="0" err="1"/>
-              <a:t>entire</a:t>
-            </a:r>
-            <a:r>
-              <a:rPr lang="it-IT" dirty="0"/>
-              <a:t> </a:t>
-            </a:r>
-            <a:r>
-              <a:rPr lang="it-IT" dirty="0" err="1"/>
-              <a:t>Mediterranean</a:t>
-            </a:r>
-            <a:r>
-              <a:rPr lang="it-IT" dirty="0"/>
-              <a:t> </a:t>
-            </a:r>
-            <a:r>
-              <a:rPr lang="it-IT" dirty="0" err="1"/>
-              <a:t>sea</a:t>
-            </a:r>
+              <a:t>problem</a:t>
+            </a:r>
+            <a:r>
+              <a:rPr lang="it-IT" dirty="0"/>
+              <a:t>)</a:t>
+            </a:r>
+          </a:p>
+          <a:p>
+            <a:r>
+              <a:rPr lang="it-IT" dirty="0"/>
+              <a:t>Vincoli: includere almeno una porzione minima (</a:t>
+            </a:r>
+            <a:r>
+              <a:rPr lang="it-IT" i="1" dirty="0"/>
+              <a:t>target</a:t>
+            </a:r>
+            <a:r>
+              <a:rPr lang="it-IT" dirty="0"/>
+              <a:t>) dell’areale di presenza di ogni specie:</a:t>
+            </a:r>
+          </a:p>
+          <a:p>
+            <a:pPr lvl="1"/>
+            <a:r>
+              <a:rPr lang="it-IT" dirty="0"/>
+              <a:t>target unico = 20%</a:t>
+            </a:r>
+          </a:p>
+          <a:p>
+            <a:pPr lvl="1"/>
+            <a:r>
+              <a:rPr lang="it-IT" dirty="0"/>
+              <a:t>target variabile funzione dell’areale (più alto per specie più rare)</a:t>
+            </a:r>
+            <a:br>
+              <a:rPr lang="it-IT" dirty="0"/>
+            </a:br>
             <a:endParaRPr lang="it-IT" dirty="0"/>
           </a:p>
         </p:txBody>
       </p:sp>
-      <p:sp>
-        <p:nvSpPr>
-          <p:cNvPr id="3" name="Segnaposto contenuto 2">
-            <a:extLst>
-              <a:ext uri="{FF2B5EF4-FFF2-40B4-BE49-F238E27FC236}">
-                <a16:creationId xmlns:a16="http://schemas.microsoft.com/office/drawing/2014/main" id="{3262E191-1401-1B0F-D6A7-BB973AE7B186}"/>
-              </a:ext>
-            </a:extLst>
-          </p:cNvPr>
-          <p:cNvSpPr>
-            <a:spLocks noGrp="1"/>
-          </p:cNvSpPr>
-          <p:nvPr>
-            <p:ph idx="1"/>
-          </p:nvPr>
-        </p:nvSpPr>
-        <p:spPr/>
-        <p:txBody>
-          <a:bodyPr/>
-          <a:lstStyle/>
-          <a:p>
-            <a:r>
-              <a:rPr lang="it-IT" dirty="0"/>
-              <a:t>26,000 Planning </a:t>
-            </a:r>
-            <a:r>
-              <a:rPr lang="it-IT" dirty="0" err="1"/>
-              <a:t>units</a:t>
-            </a:r>
-            <a:r>
-              <a:rPr lang="it-IT" dirty="0"/>
-              <a:t> (</a:t>
+      <p:pic>
+        <p:nvPicPr>
+          <p:cNvPr id="5" name="Immagine 4">
+            <a:extLst>
+              <a:ext uri="{FF2B5EF4-FFF2-40B4-BE49-F238E27FC236}">
+                <a16:creationId xmlns:a16="http://schemas.microsoft.com/office/drawing/2014/main" id="{8774788C-4CB1-DF88-A80A-C81EDEE858A3}"/>
+              </a:ext>
+            </a:extLst>
+          </p:cNvPr>
+          <p:cNvPicPr>
+            <a:picLocks noChangeAspect="1"/>
+          </p:cNvPicPr>
+          <p:nvPr/>
+        </p:nvPicPr>
+        <p:blipFill rotWithShape="1">
+          <a:blip r:embed="rId2"/>
+          <a:srcRect r="20797"/>
+          <a:stretch/>
+        </p:blipFill>
+        <p:spPr>
+          <a:xfrm>
+            <a:off x="568925" y="2809188"/>
+            <a:ext cx="3739126" cy="3017706"/>
+          </a:xfrm>
+          <a:prstGeom prst="rect">
+            <a:avLst/>
+          </a:prstGeom>
+        </p:spPr>
+      </p:pic>
+      <p:pic>
+        <p:nvPicPr>
+          <p:cNvPr id="11" name="Immagine 10">
+            <a:extLst>
+              <a:ext uri="{FF2B5EF4-FFF2-40B4-BE49-F238E27FC236}">
+                <a16:creationId xmlns:a16="http://schemas.microsoft.com/office/drawing/2014/main" id="{9AE25132-7146-DC11-7AD1-70251E86AF75}"/>
+              </a:ext>
+            </a:extLst>
+          </p:cNvPr>
+          <p:cNvPicPr>
+            <a:picLocks noChangeAspect="1"/>
+          </p:cNvPicPr>
+          <p:nvPr/>
+        </p:nvPicPr>
+        <p:blipFill rotWithShape="1">
+          <a:blip r:embed="rId3"/>
+          <a:srcRect t="13420" r="17691" b="12214"/>
+          <a:stretch/>
+        </p:blipFill>
+        <p:spPr>
+          <a:xfrm>
+            <a:off x="4871030" y="2918401"/>
+            <a:ext cx="3935476" cy="2837469"/>
+          </a:xfrm>
+          <a:prstGeom prst="rect">
+            <a:avLst/>
+          </a:prstGeom>
+        </p:spPr>
+      </p:pic>
+      <p:pic>
+        <p:nvPicPr>
+          <p:cNvPr id="13" name="Immagine 12">
+            <a:extLst>
+              <a:ext uri="{FF2B5EF4-FFF2-40B4-BE49-F238E27FC236}">
+                <a16:creationId xmlns:a16="http://schemas.microsoft.com/office/drawing/2014/main" id="{EFE9A6AF-95B6-F572-5633-CCCC802EE8E2}"/>
+              </a:ext>
+            </a:extLst>
+          </p:cNvPr>
+          <p:cNvPicPr>
+            <a:picLocks noChangeAspect="1"/>
+          </p:cNvPicPr>
+          <p:nvPr/>
+        </p:nvPicPr>
+        <p:blipFill>
+          <a:blip r:embed="rId4"/>
+          <a:stretch>
+            <a:fillRect/>
+          </a:stretch>
+        </p:blipFill>
+        <p:spPr>
+          <a:xfrm>
+            <a:off x="8591550" y="3747156"/>
+            <a:ext cx="2762250" cy="2686050"/>
+          </a:xfrm>
+          <a:prstGeom prst="rect">
+            <a:avLst/>
+          </a:prstGeom>
+        </p:spPr>
+      </p:pic>
+      <p:sp>
+        <p:nvSpPr>
+          <p:cNvPr id="14" name="CasellaDiTesto 13">
+            <a:extLst>
+              <a:ext uri="{FF2B5EF4-FFF2-40B4-BE49-F238E27FC236}">
+                <a16:creationId xmlns:a16="http://schemas.microsoft.com/office/drawing/2014/main" id="{35CCC1B5-DF6E-DC27-BD7C-C9DA8DED1B55}"/>
+              </a:ext>
+            </a:extLst>
+          </p:cNvPr>
+          <p:cNvSpPr txBox="1"/>
+          <p:nvPr/>
+        </p:nvSpPr>
+        <p:spPr>
+          <a:xfrm>
+            <a:off x="584724" y="5723199"/>
+            <a:ext cx="2239139" cy="923330"/>
+          </a:xfrm>
+          <a:prstGeom prst="rect">
+            <a:avLst/>
+          </a:prstGeom>
+          <a:noFill/>
+        </p:spPr>
+        <p:txBody>
+          <a:bodyPr wrap="none" rtlCol="0">
+            <a:spAutoFit/>
+          </a:bodyPr>
+          <a:lstStyle/>
+          <a:p>
+            <a:r>
+              <a:rPr lang="it-IT" dirty="0"/>
+              <a:t>Target unico</a:t>
+            </a:r>
+          </a:p>
+          <a:p>
+            <a:r>
+              <a:rPr lang="it-IT" dirty="0"/>
+              <a:t>370 </a:t>
             </a:r>
             <a:r>
               <a:rPr lang="it-IT" dirty="0" err="1"/>
@@ -3569,7 +3850,68 @@
             </a:r>
             <a:r>
               <a:rPr lang="it-IT" dirty="0"/>
-              <a:t>) 10 km X 10 km</a:t>
+              <a:t> selezionate</a:t>
+            </a:r>
+          </a:p>
+          <a:p>
+            <a:r>
+              <a:rPr lang="it-IT" dirty="0"/>
+              <a:t>costo totale: 1399 M€</a:t>
+            </a:r>
+          </a:p>
+        </p:txBody>
+      </p:sp>
+      <p:sp>
+        <p:nvSpPr>
+          <p:cNvPr id="15" name="CasellaDiTesto 14">
+            <a:extLst>
+              <a:ext uri="{FF2B5EF4-FFF2-40B4-BE49-F238E27FC236}">
+                <a16:creationId xmlns:a16="http://schemas.microsoft.com/office/drawing/2014/main" id="{8EA30C80-C862-E01F-B876-82D567A6F403}"/>
+              </a:ext>
+            </a:extLst>
+          </p:cNvPr>
+          <p:cNvSpPr txBox="1"/>
+          <p:nvPr/>
+        </p:nvSpPr>
+        <p:spPr>
+          <a:xfrm>
+            <a:off x="4927397" y="5724677"/>
+            <a:ext cx="2239139" cy="923330"/>
+          </a:xfrm>
+          <a:prstGeom prst="rect">
+            <a:avLst/>
+          </a:prstGeom>
+          <a:noFill/>
+        </p:spPr>
+        <p:txBody>
+          <a:bodyPr wrap="none" rtlCol="0">
+            <a:spAutoFit/>
+          </a:bodyPr>
+          <a:lstStyle/>
+          <a:p>
+            <a:r>
+              <a:rPr lang="it-IT" dirty="0"/>
+              <a:t>Target variabile</a:t>
+            </a:r>
+          </a:p>
+          <a:p>
+            <a:r>
+              <a:rPr lang="it-IT" dirty="0"/>
+              <a:t>841 </a:t>
+            </a:r>
+            <a:r>
+              <a:rPr lang="it-IT" dirty="0" err="1"/>
+              <a:t>PUs</a:t>
+            </a:r>
+            <a:r>
+              <a:rPr lang="it-IT" dirty="0"/>
+              <a:t> selezionate</a:t>
+            </a:r>
+          </a:p>
+          <a:p>
+            <a:r>
+              <a:rPr lang="it-IT" dirty="0"/>
+              <a:t>costo totale: 4024 M€</a:t>
             </a:r>
           </a:p>
         </p:txBody>
@@ -3577,7 +3919,2447 @@
     </p:spTree>
     <p:extLst>
       <p:ext uri="{BB962C8B-B14F-4D97-AF65-F5344CB8AC3E}">
-        <p14:creationId xmlns:p14="http://schemas.microsoft.com/office/powerpoint/2010/main" val="1578644049"/>
+        <p14:creationId xmlns:p14="http://schemas.microsoft.com/office/powerpoint/2010/main" val="1705857365"/>
+      </p:ext>
+    </p:extLst>
+  </p:cSld>
+  <p:clrMapOvr>
+    <a:masterClrMapping/>
+  </p:clrMapOvr>
+</p:sld>
+</file>
+
+<file path=ppt/slides/slide12.xml><?xml version="1.0" encoding="utf-8"?>
+<p:sld xmlns:a="http://schemas.openxmlformats.org/drawingml/2006/main" xmlns:r="http://schemas.openxmlformats.org/officeDocument/2006/relationships" xmlns:p="http://schemas.openxmlformats.org/presentationml/2006/main">
+  <p:cSld>
+    <p:spTree>
+      <p:nvGrpSpPr>
+        <p:cNvPr id="1" name=""/>
+        <p:cNvGrpSpPr/>
+        <p:nvPr/>
+      </p:nvGrpSpPr>
+      <p:grpSpPr>
+        <a:xfrm>
+          <a:off x="0" y="0"/>
+          <a:ext cx="0" cy="0"/>
+          <a:chOff x="0" y="0"/>
+          <a:chExt cx="0" cy="0"/>
+        </a:xfrm>
+      </p:grpSpPr>
+      <p:sp>
+        <p:nvSpPr>
+          <p:cNvPr id="3" name="Segnaposto contenuto 2">
+            <a:extLst>
+              <a:ext uri="{FF2B5EF4-FFF2-40B4-BE49-F238E27FC236}">
+                <a16:creationId xmlns:a16="http://schemas.microsoft.com/office/drawing/2014/main" id="{4F6D6E05-ABD7-34EE-7C21-AF7C124DF63C}"/>
+              </a:ext>
+            </a:extLst>
+          </p:cNvPr>
+          <p:cNvSpPr>
+            <a:spLocks noGrp="1"/>
+          </p:cNvSpPr>
+          <p:nvPr>
+            <p:ph idx="1"/>
+          </p:nvPr>
+        </p:nvSpPr>
+        <p:spPr>
+          <a:xfrm>
+            <a:off x="838200" y="479394"/>
+            <a:ext cx="10515600" cy="5697569"/>
+          </a:xfrm>
+        </p:spPr>
+        <p:txBody>
+          <a:bodyPr/>
+          <a:lstStyle/>
+          <a:p>
+            <a:r>
+              <a:rPr lang="it-IT" dirty="0"/>
+              <a:t>Codice:</a:t>
+            </a:r>
+          </a:p>
+          <a:p>
+            <a:endParaRPr lang="it-IT" dirty="0"/>
+          </a:p>
+          <a:p>
+            <a:endParaRPr lang="it-IT" dirty="0"/>
+          </a:p>
+          <a:p>
+            <a:endParaRPr lang="it-IT" dirty="0"/>
+          </a:p>
+          <a:p>
+            <a:endParaRPr lang="it-IT" dirty="0"/>
+          </a:p>
+          <a:p>
+            <a:r>
+              <a:rPr lang="it-IT" dirty="0" err="1"/>
+              <a:t>Summary</a:t>
+            </a:r>
+            <a:r>
+              <a:rPr lang="it-IT" dirty="0"/>
+              <a:t> </a:t>
+            </a:r>
+            <a:r>
+              <a:rPr lang="it-IT" dirty="0" err="1"/>
+              <a:t>statistics</a:t>
+            </a:r>
+            <a:r>
+              <a:rPr lang="it-IT" dirty="0"/>
+              <a:t>:</a:t>
+            </a:r>
+          </a:p>
+          <a:p>
+            <a:pPr lvl="1"/>
+            <a:r>
+              <a:rPr lang="it-IT" dirty="0"/>
+              <a:t>numero di planning </a:t>
+            </a:r>
+            <a:r>
+              <a:rPr lang="it-IT" dirty="0" err="1"/>
+              <a:t>units</a:t>
+            </a:r>
+            <a:r>
+              <a:rPr lang="it-IT" dirty="0"/>
+              <a:t> selezionate</a:t>
+            </a:r>
+          </a:p>
+          <a:p>
+            <a:pPr lvl="1"/>
+            <a:r>
+              <a:rPr lang="it-IT" dirty="0"/>
+              <a:t>costo totale</a:t>
+            </a:r>
+          </a:p>
+          <a:p>
+            <a:pPr lvl="1"/>
+            <a:r>
+              <a:rPr lang="it-IT" dirty="0"/>
+              <a:t>rappresentazione delle features</a:t>
+            </a:r>
+          </a:p>
+          <a:p>
+            <a:pPr lvl="1"/>
+            <a:r>
+              <a:rPr lang="it-IT" dirty="0"/>
+              <a:t>Raggiungimento dei target</a:t>
+            </a:r>
+          </a:p>
+          <a:p>
+            <a:r>
+              <a:rPr lang="it-IT" dirty="0"/>
+              <a:t>Scores di importanza</a:t>
+            </a:r>
+            <a:br>
+              <a:rPr lang="it-IT" dirty="0"/>
+            </a:br>
+            <a:r>
+              <a:rPr lang="it-IT" dirty="0"/>
+              <a:t>(</a:t>
+            </a:r>
+            <a:r>
+              <a:rPr lang="it-IT" i="1" dirty="0" err="1"/>
+              <a:t>irreplaceability</a:t>
+            </a:r>
+            <a:r>
+              <a:rPr lang="it-IT" i="1" dirty="0"/>
+              <a:t> scores</a:t>
+            </a:r>
+            <a:r>
+              <a:rPr lang="it-IT" dirty="0"/>
+              <a:t>)</a:t>
+            </a:r>
+          </a:p>
+        </p:txBody>
+      </p:sp>
+      <p:sp>
+        <p:nvSpPr>
+          <p:cNvPr id="4" name="CasellaDiTesto 3">
+            <a:extLst>
+              <a:ext uri="{FF2B5EF4-FFF2-40B4-BE49-F238E27FC236}">
+                <a16:creationId xmlns:a16="http://schemas.microsoft.com/office/drawing/2014/main" id="{6B8D0819-817E-07BC-60BD-AE85B48AE813}"/>
+              </a:ext>
+            </a:extLst>
+          </p:cNvPr>
+          <p:cNvSpPr txBox="1"/>
+          <p:nvPr/>
+        </p:nvSpPr>
+        <p:spPr>
+          <a:xfrm>
+            <a:off x="1144164" y="1035874"/>
+            <a:ext cx="9429184" cy="1754326"/>
+          </a:xfrm>
+          <a:prstGeom prst="rect">
+            <a:avLst/>
+          </a:prstGeom>
+          <a:noFill/>
+        </p:spPr>
+        <p:txBody>
+          <a:bodyPr wrap="none" rtlCol="0">
+            <a:spAutoFit/>
+          </a:bodyPr>
+          <a:lstStyle/>
+          <a:p>
+            <a:r>
+              <a:rPr lang="en-US" dirty="0">
+                <a:latin typeface="Consolas" panose="020B0609020204030204" pitchFamily="49" charset="0"/>
+              </a:rPr>
+              <a:t>p1 &lt;-  problem(pus, features = </a:t>
+            </a:r>
+            <a:r>
+              <a:rPr lang="en-US" dirty="0" err="1">
+                <a:latin typeface="Consolas" panose="020B0609020204030204" pitchFamily="49" charset="0"/>
+              </a:rPr>
+              <a:t>features_present</a:t>
+            </a:r>
+            <a:r>
+              <a:rPr lang="en-US" dirty="0">
+                <a:latin typeface="Consolas" panose="020B0609020204030204" pitchFamily="49" charset="0"/>
+              </a:rPr>
+              <a:t>, </a:t>
+            </a:r>
+            <a:r>
+              <a:rPr lang="en-US" dirty="0" err="1">
+                <a:latin typeface="Consolas" panose="020B0609020204030204" pitchFamily="49" charset="0"/>
+              </a:rPr>
+              <a:t>cost_column</a:t>
+            </a:r>
+            <a:r>
+              <a:rPr lang="en-US" dirty="0">
+                <a:latin typeface="Consolas" panose="020B0609020204030204" pitchFamily="49" charset="0"/>
+              </a:rPr>
+              <a:t>="cost") %&gt;% </a:t>
+            </a:r>
+          </a:p>
+          <a:p>
+            <a:r>
+              <a:rPr lang="en-US" dirty="0">
+                <a:latin typeface="Consolas" panose="020B0609020204030204" pitchFamily="49" charset="0"/>
+              </a:rPr>
+              <a:t>	</a:t>
+            </a:r>
+            <a:r>
+              <a:rPr lang="en-US" dirty="0" err="1">
+                <a:latin typeface="Consolas" panose="020B0609020204030204" pitchFamily="49" charset="0"/>
+              </a:rPr>
+              <a:t>add_min_set_objective</a:t>
+            </a:r>
+            <a:r>
+              <a:rPr lang="en-US" dirty="0">
+                <a:latin typeface="Consolas" panose="020B0609020204030204" pitchFamily="49" charset="0"/>
+              </a:rPr>
+              <a:t>() %&gt;%</a:t>
+            </a:r>
+          </a:p>
+          <a:p>
+            <a:r>
+              <a:rPr lang="en-US" dirty="0">
+                <a:latin typeface="Consolas" panose="020B0609020204030204" pitchFamily="49" charset="0"/>
+              </a:rPr>
+              <a:t>	</a:t>
+            </a:r>
+            <a:r>
+              <a:rPr lang="en-US" dirty="0" err="1">
+                <a:latin typeface="Consolas" panose="020B0609020204030204" pitchFamily="49" charset="0"/>
+              </a:rPr>
+              <a:t>add_relative_targets</a:t>
+            </a:r>
+            <a:r>
+              <a:rPr lang="en-US" dirty="0">
+                <a:latin typeface="Consolas" panose="020B0609020204030204" pitchFamily="49" charset="0"/>
+              </a:rPr>
+              <a:t>(0.2) %&gt;%</a:t>
+            </a:r>
+          </a:p>
+          <a:p>
+            <a:r>
+              <a:rPr lang="en-US" dirty="0">
+                <a:latin typeface="Consolas" panose="020B0609020204030204" pitchFamily="49" charset="0"/>
+              </a:rPr>
+              <a:t>	</a:t>
+            </a:r>
+            <a:r>
+              <a:rPr lang="en-US" dirty="0" err="1">
+                <a:latin typeface="Consolas" panose="020B0609020204030204" pitchFamily="49" charset="0"/>
+              </a:rPr>
+              <a:t>add_binary_decisions</a:t>
+            </a:r>
+            <a:r>
+              <a:rPr lang="en-US" dirty="0">
+                <a:latin typeface="Consolas" panose="020B0609020204030204" pitchFamily="49" charset="0"/>
+              </a:rPr>
+              <a:t>() %&gt;%</a:t>
+            </a:r>
+          </a:p>
+          <a:p>
+            <a:r>
+              <a:rPr lang="en-US" dirty="0">
+                <a:latin typeface="Consolas" panose="020B0609020204030204" pitchFamily="49" charset="0"/>
+              </a:rPr>
+              <a:t>	</a:t>
+            </a:r>
+            <a:r>
+              <a:rPr lang="en-US" dirty="0" err="1">
+                <a:latin typeface="Consolas" panose="020B0609020204030204" pitchFamily="49" charset="0"/>
+              </a:rPr>
+              <a:t>add_gurobi_solver</a:t>
+            </a:r>
+            <a:r>
+              <a:rPr lang="en-US" dirty="0">
+                <a:latin typeface="Consolas" panose="020B0609020204030204" pitchFamily="49" charset="0"/>
+              </a:rPr>
+              <a:t>(gap = 0.1, verbose = T)</a:t>
+            </a:r>
+          </a:p>
+          <a:p>
+            <a:r>
+              <a:rPr lang="en-US" dirty="0">
+                <a:latin typeface="Consolas" panose="020B0609020204030204" pitchFamily="49" charset="0"/>
+              </a:rPr>
+              <a:t>s1 &lt;- solve(p1)</a:t>
+            </a:r>
+            <a:endParaRPr lang="it-IT" dirty="0">
+              <a:latin typeface="Consolas" panose="020B0609020204030204" pitchFamily="49" charset="0"/>
+            </a:endParaRPr>
+          </a:p>
+        </p:txBody>
+      </p:sp>
+      <p:pic>
+        <p:nvPicPr>
+          <p:cNvPr id="5" name="Immagine 4">
+            <a:extLst>
+              <a:ext uri="{FF2B5EF4-FFF2-40B4-BE49-F238E27FC236}">
+                <a16:creationId xmlns:a16="http://schemas.microsoft.com/office/drawing/2014/main" id="{C5AC61B3-3F4F-4ECD-04CA-9D10862550DE}"/>
+              </a:ext>
+            </a:extLst>
+          </p:cNvPr>
+          <p:cNvPicPr>
+            <a:picLocks noChangeAspect="1"/>
+          </p:cNvPicPr>
+          <p:nvPr/>
+        </p:nvPicPr>
+        <p:blipFill rotWithShape="1">
+          <a:blip r:embed="rId2"/>
+          <a:srcRect r="12000"/>
+          <a:stretch/>
+        </p:blipFill>
+        <p:spPr>
+          <a:xfrm>
+            <a:off x="6969109" y="2626185"/>
+            <a:ext cx="5222891" cy="3963370"/>
+          </a:xfrm>
+          <a:prstGeom prst="rect">
+            <a:avLst/>
+          </a:prstGeom>
+        </p:spPr>
+      </p:pic>
+    </p:spTree>
+    <p:extLst>
+      <p:ext uri="{BB962C8B-B14F-4D97-AF65-F5344CB8AC3E}">
+        <p14:creationId xmlns:p14="http://schemas.microsoft.com/office/powerpoint/2010/main" val="1283544523"/>
+      </p:ext>
+    </p:extLst>
+  </p:cSld>
+  <p:clrMapOvr>
+    <a:masterClrMapping/>
+  </p:clrMapOvr>
+</p:sld>
+</file>
+
+<file path=ppt/slides/slide13.xml><?xml version="1.0" encoding="utf-8"?>
+<p:sld xmlns:a="http://schemas.openxmlformats.org/drawingml/2006/main" xmlns:r="http://schemas.openxmlformats.org/officeDocument/2006/relationships" xmlns:p="http://schemas.openxmlformats.org/presentationml/2006/main">
+  <p:cSld>
+    <p:spTree>
+      <p:nvGrpSpPr>
+        <p:cNvPr id="1" name=""/>
+        <p:cNvGrpSpPr/>
+        <p:nvPr/>
+      </p:nvGrpSpPr>
+      <p:grpSpPr>
+        <a:xfrm>
+          <a:off x="0" y="0"/>
+          <a:ext cx="0" cy="0"/>
+          <a:chOff x="0" y="0"/>
+          <a:chExt cx="0" cy="0"/>
+        </a:xfrm>
+      </p:grpSpPr>
+      <p:pic>
+        <p:nvPicPr>
+          <p:cNvPr id="4" name="Immagine 3">
+            <a:extLst>
+              <a:ext uri="{FF2B5EF4-FFF2-40B4-BE49-F238E27FC236}">
+                <a16:creationId xmlns:a16="http://schemas.microsoft.com/office/drawing/2014/main" id="{5BBF06EB-66A8-DDC7-00B5-DDCAD1AFCA17}"/>
+              </a:ext>
+            </a:extLst>
+          </p:cNvPr>
+          <p:cNvPicPr>
+            <a:picLocks noChangeAspect="1"/>
+          </p:cNvPicPr>
+          <p:nvPr/>
+        </p:nvPicPr>
+        <p:blipFill rotWithShape="1">
+          <a:blip r:embed="rId2"/>
+          <a:srcRect l="2641" t="3551" r="1871" b="4572"/>
+          <a:stretch/>
+        </p:blipFill>
+        <p:spPr>
+          <a:xfrm>
+            <a:off x="946362" y="1719679"/>
+            <a:ext cx="7354929" cy="4839363"/>
+          </a:xfrm>
+          <a:prstGeom prst="rect">
+            <a:avLst/>
+          </a:prstGeom>
+        </p:spPr>
+      </p:pic>
+      <p:sp>
+        <p:nvSpPr>
+          <p:cNvPr id="5" name="Freccia in su 4">
+            <a:extLst>
+              <a:ext uri="{FF2B5EF4-FFF2-40B4-BE49-F238E27FC236}">
+                <a16:creationId xmlns:a16="http://schemas.microsoft.com/office/drawing/2014/main" id="{6B461583-2AA2-43CB-FBB2-3F2E34A25956}"/>
+              </a:ext>
+            </a:extLst>
+          </p:cNvPr>
+          <p:cNvSpPr/>
+          <p:nvPr/>
+        </p:nvSpPr>
+        <p:spPr>
+          <a:xfrm>
+            <a:off x="2452982" y="1072643"/>
+            <a:ext cx="546755" cy="688156"/>
+          </a:xfrm>
+          <a:prstGeom prst="upArrow">
+            <a:avLst/>
+          </a:prstGeom>
+          <a:solidFill>
+            <a:srgbClr val="033F63"/>
+          </a:solidFill>
+        </p:spPr>
+        <p:style>
+          <a:lnRef idx="2">
+            <a:schemeClr val="accent1">
+              <a:shade val="15000"/>
+            </a:schemeClr>
+          </a:lnRef>
+          <a:fillRef idx="1">
+            <a:schemeClr val="accent1"/>
+          </a:fillRef>
+          <a:effectRef idx="0">
+            <a:schemeClr val="accent1"/>
+          </a:effectRef>
+          <a:fontRef idx="minor">
+            <a:schemeClr val="lt1"/>
+          </a:fontRef>
+        </p:style>
+        <p:txBody>
+          <a:bodyPr rtlCol="0" anchor="ctr"/>
+          <a:lstStyle/>
+          <a:p>
+            <a:pPr algn="ctr"/>
+            <a:endParaRPr lang="it-IT"/>
+          </a:p>
+        </p:txBody>
+      </p:sp>
+      <p:sp>
+        <p:nvSpPr>
+          <p:cNvPr id="6" name="Freccia in su 5">
+            <a:extLst>
+              <a:ext uri="{FF2B5EF4-FFF2-40B4-BE49-F238E27FC236}">
+                <a16:creationId xmlns:a16="http://schemas.microsoft.com/office/drawing/2014/main" id="{5C1ACB1A-92BF-546A-1ABF-A8EE37A51919}"/>
+              </a:ext>
+            </a:extLst>
+          </p:cNvPr>
+          <p:cNvSpPr/>
+          <p:nvPr/>
+        </p:nvSpPr>
+        <p:spPr>
+          <a:xfrm rot="5400000">
+            <a:off x="8230890" y="4929474"/>
+            <a:ext cx="546755" cy="688156"/>
+          </a:xfrm>
+          <a:prstGeom prst="upArrow">
+            <a:avLst/>
+          </a:prstGeom>
+          <a:solidFill>
+            <a:srgbClr val="B5B682"/>
+          </a:solidFill>
+          <a:ln>
+            <a:solidFill>
+              <a:srgbClr val="B5B682"/>
+            </a:solidFill>
+          </a:ln>
+        </p:spPr>
+        <p:style>
+          <a:lnRef idx="2">
+            <a:schemeClr val="accent1">
+              <a:shade val="15000"/>
+            </a:schemeClr>
+          </a:lnRef>
+          <a:fillRef idx="1">
+            <a:schemeClr val="accent1"/>
+          </a:fillRef>
+          <a:effectRef idx="0">
+            <a:schemeClr val="accent1"/>
+          </a:effectRef>
+          <a:fontRef idx="minor">
+            <a:schemeClr val="lt1"/>
+          </a:fontRef>
+        </p:style>
+        <p:txBody>
+          <a:bodyPr rtlCol="0" anchor="ctr"/>
+          <a:lstStyle/>
+          <a:p>
+            <a:pPr algn="ctr"/>
+            <a:endParaRPr lang="it-IT"/>
+          </a:p>
+        </p:txBody>
+      </p:sp>
+      <p:sp>
+        <p:nvSpPr>
+          <p:cNvPr id="7" name="CasellaDiTesto 6">
+            <a:extLst>
+              <a:ext uri="{FF2B5EF4-FFF2-40B4-BE49-F238E27FC236}">
+                <a16:creationId xmlns:a16="http://schemas.microsoft.com/office/drawing/2014/main" id="{61D26AB1-C983-6A6E-607F-6924FDAD1617}"/>
+              </a:ext>
+            </a:extLst>
+          </p:cNvPr>
+          <p:cNvSpPr txBox="1"/>
+          <p:nvPr/>
+        </p:nvSpPr>
+        <p:spPr>
+          <a:xfrm>
+            <a:off x="9010835" y="5095782"/>
+            <a:ext cx="1460400" cy="369332"/>
+          </a:xfrm>
+          <a:prstGeom prst="rect">
+            <a:avLst/>
+          </a:prstGeom>
+          <a:noFill/>
+        </p:spPr>
+        <p:txBody>
+          <a:bodyPr wrap="none" rtlCol="0">
+            <a:spAutoFit/>
+          </a:bodyPr>
+          <a:lstStyle/>
+          <a:p>
+            <a:r>
+              <a:rPr lang="it-IT" dirty="0"/>
+              <a:t>Target più alti</a:t>
+            </a:r>
+          </a:p>
+        </p:txBody>
+      </p:sp>
+      <p:sp>
+        <p:nvSpPr>
+          <p:cNvPr id="8" name="CasellaDiTesto 7">
+            <a:extLst>
+              <a:ext uri="{FF2B5EF4-FFF2-40B4-BE49-F238E27FC236}">
+                <a16:creationId xmlns:a16="http://schemas.microsoft.com/office/drawing/2014/main" id="{FD2CB0B0-3DB7-5529-5D56-4C440D498A76}"/>
+              </a:ext>
+            </a:extLst>
+          </p:cNvPr>
+          <p:cNvSpPr txBox="1"/>
+          <p:nvPr/>
+        </p:nvSpPr>
+        <p:spPr>
+          <a:xfrm>
+            <a:off x="1927934" y="498629"/>
+            <a:ext cx="1631922" cy="369332"/>
+          </a:xfrm>
+          <a:prstGeom prst="rect">
+            <a:avLst/>
+          </a:prstGeom>
+          <a:noFill/>
+        </p:spPr>
+        <p:txBody>
+          <a:bodyPr wrap="none" rtlCol="0">
+            <a:spAutoFit/>
+          </a:bodyPr>
+          <a:lstStyle/>
+          <a:p>
+            <a:r>
+              <a:rPr lang="it-IT" dirty="0"/>
+              <a:t>Target più bassi</a:t>
+            </a:r>
+          </a:p>
+        </p:txBody>
+      </p:sp>
+      <p:sp>
+        <p:nvSpPr>
+          <p:cNvPr id="9" name="Titolo 8">
+            <a:extLst>
+              <a:ext uri="{FF2B5EF4-FFF2-40B4-BE49-F238E27FC236}">
+                <a16:creationId xmlns:a16="http://schemas.microsoft.com/office/drawing/2014/main" id="{B326FBA9-182F-8054-275F-55558F0BBF88}"/>
+              </a:ext>
+            </a:extLst>
+          </p:cNvPr>
+          <p:cNvSpPr>
+            <a:spLocks noGrp="1"/>
+          </p:cNvSpPr>
+          <p:nvPr>
+            <p:ph type="title"/>
+          </p:nvPr>
+        </p:nvSpPr>
+        <p:spPr>
+          <a:xfrm>
+            <a:off x="4971495" y="365126"/>
+            <a:ext cx="6382304" cy="797850"/>
+          </a:xfrm>
+        </p:spPr>
+        <p:txBody>
+          <a:bodyPr/>
+          <a:lstStyle/>
+          <a:p>
+            <a:r>
+              <a:rPr lang="it-IT" dirty="0"/>
+              <a:t>Rispecchiare gli scenari</a:t>
+            </a:r>
+          </a:p>
+        </p:txBody>
+      </p:sp>
+    </p:spTree>
+    <p:extLst>
+      <p:ext uri="{BB962C8B-B14F-4D97-AF65-F5344CB8AC3E}">
+        <p14:creationId xmlns:p14="http://schemas.microsoft.com/office/powerpoint/2010/main" val="3587888745"/>
+      </p:ext>
+    </p:extLst>
+  </p:cSld>
+  <p:clrMapOvr>
+    <a:masterClrMapping/>
+  </p:clrMapOvr>
+</p:sld>
+</file>
+
+<file path=ppt/slides/slide14.xml><?xml version="1.0" encoding="utf-8"?>
+<p:sld xmlns:a="http://schemas.openxmlformats.org/drawingml/2006/main" xmlns:r="http://schemas.openxmlformats.org/officeDocument/2006/relationships" xmlns:p="http://schemas.openxmlformats.org/presentationml/2006/main">
+  <p:cSld>
+    <p:spTree>
+      <p:nvGrpSpPr>
+        <p:cNvPr id="1" name=""/>
+        <p:cNvGrpSpPr/>
+        <p:nvPr/>
+      </p:nvGrpSpPr>
+      <p:grpSpPr>
+        <a:xfrm>
+          <a:off x="0" y="0"/>
+          <a:ext cx="0" cy="0"/>
+          <a:chOff x="0" y="0"/>
+          <a:chExt cx="0" cy="0"/>
+        </a:xfrm>
+      </p:grpSpPr>
+      <p:sp>
+        <p:nvSpPr>
+          <p:cNvPr id="2" name="Titolo 1">
+            <a:extLst>
+              <a:ext uri="{FF2B5EF4-FFF2-40B4-BE49-F238E27FC236}">
+                <a16:creationId xmlns:a16="http://schemas.microsoft.com/office/drawing/2014/main" id="{DD445302-C1D6-3B70-BB40-9116FAF4CF1C}"/>
+              </a:ext>
+            </a:extLst>
+          </p:cNvPr>
+          <p:cNvSpPr>
+            <a:spLocks noGrp="1"/>
+          </p:cNvSpPr>
+          <p:nvPr>
+            <p:ph type="title"/>
+          </p:nvPr>
+        </p:nvSpPr>
+        <p:spPr>
+          <a:xfrm>
+            <a:off x="838200" y="1"/>
+            <a:ext cx="10515600" cy="871374"/>
+          </a:xfrm>
+        </p:spPr>
+        <p:txBody>
+          <a:bodyPr/>
+          <a:lstStyle/>
+          <a:p>
+            <a:r>
+              <a:rPr lang="it-IT" dirty="0"/>
+              <a:t>Connettività</a:t>
+            </a:r>
+          </a:p>
+        </p:txBody>
+      </p:sp>
+      <p:sp>
+        <p:nvSpPr>
+          <p:cNvPr id="3" name="Segnaposto contenuto 2">
+            <a:extLst>
+              <a:ext uri="{FF2B5EF4-FFF2-40B4-BE49-F238E27FC236}">
+                <a16:creationId xmlns:a16="http://schemas.microsoft.com/office/drawing/2014/main" id="{88AB5368-D250-BF0B-F621-22654D5BF2D7}"/>
+              </a:ext>
+            </a:extLst>
+          </p:cNvPr>
+          <p:cNvSpPr>
+            <a:spLocks noGrp="1"/>
+          </p:cNvSpPr>
+          <p:nvPr>
+            <p:ph idx="1"/>
+          </p:nvPr>
+        </p:nvSpPr>
+        <p:spPr>
+          <a:xfrm>
+            <a:off x="838200" y="697585"/>
+            <a:ext cx="10515600" cy="2779540"/>
+          </a:xfrm>
+        </p:spPr>
+        <p:txBody>
+          <a:bodyPr/>
+          <a:lstStyle/>
+          <a:p>
+            <a:r>
+              <a:rPr lang="it-IT" dirty="0"/>
+              <a:t>Selezionare insiemi di planning </a:t>
+            </a:r>
+            <a:r>
+              <a:rPr lang="it-IT" dirty="0" err="1"/>
+              <a:t>units</a:t>
+            </a:r>
+            <a:r>
+              <a:rPr lang="it-IT" dirty="0"/>
+              <a:t> connesse:</a:t>
+            </a:r>
+          </a:p>
+          <a:p>
+            <a:pPr lvl="1"/>
+            <a:r>
+              <a:rPr lang="it-IT" dirty="0"/>
+              <a:t>usare vincoli di vicinato (</a:t>
+            </a:r>
+            <a:r>
+              <a:rPr lang="it-IT" dirty="0" err="1">
+                <a:latin typeface="Consolas" panose="020B0609020204030204" pitchFamily="49" charset="0"/>
+                <a:cs typeface="Courier New" panose="02070309020205020404" pitchFamily="49" charset="0"/>
+              </a:rPr>
+              <a:t>neighbor_constraints</a:t>
+            </a:r>
+            <a:r>
+              <a:rPr lang="it-IT" dirty="0"/>
+              <a:t>)</a:t>
+            </a:r>
+          </a:p>
+          <a:p>
+            <a:pPr lvl="1"/>
+            <a:r>
+              <a:rPr lang="it-IT" dirty="0"/>
+              <a:t>usare vincoli di contiguità (</a:t>
+            </a:r>
+            <a:r>
+              <a:rPr lang="it-IT" dirty="0" err="1">
+                <a:latin typeface="Consolas" panose="020B0609020204030204" pitchFamily="49" charset="0"/>
+                <a:cs typeface="Courier New" panose="02070309020205020404" pitchFamily="49" charset="0"/>
+              </a:rPr>
+              <a:t>contiguity_constraints</a:t>
+            </a:r>
+            <a:r>
+              <a:rPr lang="it-IT" dirty="0"/>
+              <a:t>)</a:t>
+            </a:r>
+          </a:p>
+          <a:p>
+            <a:pPr lvl="1"/>
+            <a:r>
+              <a:rPr lang="it-IT" dirty="0"/>
+              <a:t>aggiungere penalità (costo) per la lunghezza del contorno (</a:t>
+            </a:r>
+            <a:r>
+              <a:rPr lang="it-IT" dirty="0" err="1">
+                <a:latin typeface="Consolas" panose="020B0609020204030204" pitchFamily="49" charset="0"/>
+                <a:cs typeface="Courier New" panose="02070309020205020404" pitchFamily="49" charset="0"/>
+              </a:rPr>
+              <a:t>boundary_penalty</a:t>
+            </a:r>
+            <a:r>
+              <a:rPr lang="it-IT" dirty="0"/>
+              <a:t>, come in </a:t>
+            </a:r>
+            <a:r>
+              <a:rPr lang="it-IT" cap="small" dirty="0"/>
+              <a:t>Marxan</a:t>
+            </a:r>
+            <a:r>
+              <a:rPr lang="it-IT" dirty="0"/>
+              <a:t>)</a:t>
+            </a:r>
+          </a:p>
+          <a:p>
+            <a:pPr lvl="1"/>
+            <a:r>
+              <a:rPr lang="it-IT" dirty="0"/>
+              <a:t>aggiungere penalità calcolate sulla connettività tra coppie di planning </a:t>
+            </a:r>
+            <a:r>
+              <a:rPr lang="it-IT" dirty="0" err="1"/>
+              <a:t>units</a:t>
+            </a:r>
+            <a:r>
+              <a:rPr lang="it-IT" dirty="0"/>
+              <a:t> (ex: probabilità di dispersione o movimento)(</a:t>
+            </a:r>
+            <a:r>
+              <a:rPr lang="it-IT" dirty="0" err="1">
+                <a:latin typeface="Consolas" panose="020B0609020204030204" pitchFamily="49" charset="0"/>
+              </a:rPr>
+              <a:t>connectivity_penalties</a:t>
+            </a:r>
+            <a:r>
+              <a:rPr lang="it-IT" dirty="0"/>
+              <a:t>)</a:t>
+            </a:r>
+          </a:p>
+        </p:txBody>
+      </p:sp>
+    </p:spTree>
+    <p:extLst>
+      <p:ext uri="{BB962C8B-B14F-4D97-AF65-F5344CB8AC3E}">
+        <p14:creationId xmlns:p14="http://schemas.microsoft.com/office/powerpoint/2010/main" val="1587913325"/>
+      </p:ext>
+    </p:extLst>
+  </p:cSld>
+  <p:clrMapOvr>
+    <a:masterClrMapping/>
+  </p:clrMapOvr>
+</p:sld>
+</file>
+
+<file path=ppt/slides/slide15.xml><?xml version="1.0" encoding="utf-8"?>
+<p:sld xmlns:a="http://schemas.openxmlformats.org/drawingml/2006/main" xmlns:r="http://schemas.openxmlformats.org/officeDocument/2006/relationships" xmlns:p="http://schemas.openxmlformats.org/presentationml/2006/main">
+  <p:cSld>
+    <p:spTree>
+      <p:nvGrpSpPr>
+        <p:cNvPr id="1" name=""/>
+        <p:cNvGrpSpPr/>
+        <p:nvPr/>
+      </p:nvGrpSpPr>
+      <p:grpSpPr>
+        <a:xfrm>
+          <a:off x="0" y="0"/>
+          <a:ext cx="0" cy="0"/>
+          <a:chOff x="0" y="0"/>
+          <a:chExt cx="0" cy="0"/>
+        </a:xfrm>
+      </p:grpSpPr>
+      <p:sp>
+        <p:nvSpPr>
+          <p:cNvPr id="2" name="Titolo 1">
+            <a:extLst>
+              <a:ext uri="{FF2B5EF4-FFF2-40B4-BE49-F238E27FC236}">
+                <a16:creationId xmlns:a16="http://schemas.microsoft.com/office/drawing/2014/main" id="{DD445302-C1D6-3B70-BB40-9116FAF4CF1C}"/>
+              </a:ext>
+            </a:extLst>
+          </p:cNvPr>
+          <p:cNvSpPr>
+            <a:spLocks noGrp="1"/>
+          </p:cNvSpPr>
+          <p:nvPr>
+            <p:ph type="title"/>
+          </p:nvPr>
+        </p:nvSpPr>
+        <p:spPr>
+          <a:xfrm>
+            <a:off x="838200" y="1"/>
+            <a:ext cx="10515600" cy="871374"/>
+          </a:xfrm>
+        </p:spPr>
+        <p:txBody>
+          <a:bodyPr/>
+          <a:lstStyle/>
+          <a:p>
+            <a:r>
+              <a:rPr lang="it-IT" dirty="0"/>
+              <a:t>Connettività</a:t>
+            </a:r>
+          </a:p>
+        </p:txBody>
+      </p:sp>
+      <p:sp>
+        <p:nvSpPr>
+          <p:cNvPr id="3" name="Segnaposto contenuto 2">
+            <a:extLst>
+              <a:ext uri="{FF2B5EF4-FFF2-40B4-BE49-F238E27FC236}">
+                <a16:creationId xmlns:a16="http://schemas.microsoft.com/office/drawing/2014/main" id="{88AB5368-D250-BF0B-F621-22654D5BF2D7}"/>
+              </a:ext>
+            </a:extLst>
+          </p:cNvPr>
+          <p:cNvSpPr>
+            <a:spLocks noGrp="1"/>
+          </p:cNvSpPr>
+          <p:nvPr>
+            <p:ph idx="1"/>
+          </p:nvPr>
+        </p:nvSpPr>
+        <p:spPr>
+          <a:xfrm>
+            <a:off x="838200" y="697585"/>
+            <a:ext cx="10515600" cy="2779540"/>
+          </a:xfrm>
+        </p:spPr>
+        <p:txBody>
+          <a:bodyPr/>
+          <a:lstStyle/>
+          <a:p>
+            <a:r>
+              <a:rPr lang="it-IT" dirty="0"/>
+              <a:t>Selezionare insiemi di planning </a:t>
+            </a:r>
+            <a:r>
+              <a:rPr lang="it-IT" dirty="0" err="1"/>
+              <a:t>units</a:t>
+            </a:r>
+            <a:r>
+              <a:rPr lang="it-IT" dirty="0"/>
+              <a:t> connesse:</a:t>
+            </a:r>
+          </a:p>
+          <a:p>
+            <a:pPr lvl="1"/>
+            <a:r>
+              <a:rPr lang="it-IT" dirty="0"/>
+              <a:t>usare vincoli di vicinato (</a:t>
+            </a:r>
+            <a:r>
+              <a:rPr lang="it-IT" dirty="0" err="1">
+                <a:latin typeface="Consolas" panose="020B0609020204030204" pitchFamily="49" charset="0"/>
+                <a:cs typeface="Courier New" panose="02070309020205020404" pitchFamily="49" charset="0"/>
+              </a:rPr>
+              <a:t>neighbor_constraints</a:t>
+            </a:r>
+            <a:r>
+              <a:rPr lang="it-IT" dirty="0"/>
+              <a:t>)</a:t>
+            </a:r>
+          </a:p>
+          <a:p>
+            <a:pPr lvl="1"/>
+            <a:r>
+              <a:rPr lang="it-IT" dirty="0"/>
+              <a:t>usare vincoli di contiguità (</a:t>
+            </a:r>
+            <a:r>
+              <a:rPr lang="it-IT" dirty="0" err="1">
+                <a:latin typeface="Consolas" panose="020B0609020204030204" pitchFamily="49" charset="0"/>
+                <a:cs typeface="Courier New" panose="02070309020205020404" pitchFamily="49" charset="0"/>
+              </a:rPr>
+              <a:t>contiguity_constraints</a:t>
+            </a:r>
+            <a:r>
+              <a:rPr lang="it-IT" dirty="0"/>
+              <a:t>)</a:t>
+            </a:r>
+          </a:p>
+          <a:p>
+            <a:pPr lvl="1"/>
+            <a:r>
+              <a:rPr lang="it-IT" b="1" dirty="0">
+                <a:effectLst>
+                  <a:outerShdw blurRad="38100" dist="38100" dir="2700000" algn="tl">
+                    <a:srgbClr val="000000">
+                      <a:alpha val="43137"/>
+                    </a:srgbClr>
+                  </a:outerShdw>
+                </a:effectLst>
+              </a:rPr>
+              <a:t>aggiungere penalità (costo) per la lunghezza del contorno (</a:t>
+            </a:r>
+            <a:r>
+              <a:rPr lang="it-IT" b="1" dirty="0" err="1">
+                <a:effectLst>
+                  <a:outerShdw blurRad="38100" dist="38100" dir="2700000" algn="tl">
+                    <a:srgbClr val="000000">
+                      <a:alpha val="43137"/>
+                    </a:srgbClr>
+                  </a:outerShdw>
+                </a:effectLst>
+                <a:latin typeface="Consolas" panose="020B0609020204030204" pitchFamily="49" charset="0"/>
+                <a:cs typeface="Courier New" panose="02070309020205020404" pitchFamily="49" charset="0"/>
+              </a:rPr>
+              <a:t>boundary_penalty</a:t>
+            </a:r>
+            <a:r>
+              <a:rPr lang="it-IT" b="1" dirty="0">
+                <a:effectLst>
+                  <a:outerShdw blurRad="38100" dist="38100" dir="2700000" algn="tl">
+                    <a:srgbClr val="000000">
+                      <a:alpha val="43137"/>
+                    </a:srgbClr>
+                  </a:outerShdw>
+                </a:effectLst>
+              </a:rPr>
+              <a:t>, come in </a:t>
+            </a:r>
+            <a:r>
+              <a:rPr lang="it-IT" b="1" cap="small" dirty="0">
+                <a:effectLst>
+                  <a:outerShdw blurRad="38100" dist="38100" dir="2700000" algn="tl">
+                    <a:srgbClr val="000000">
+                      <a:alpha val="43137"/>
+                    </a:srgbClr>
+                  </a:outerShdw>
+                </a:effectLst>
+              </a:rPr>
+              <a:t>Marxan</a:t>
+            </a:r>
+            <a:r>
+              <a:rPr lang="it-IT" b="1" dirty="0">
+                <a:effectLst>
+                  <a:outerShdw blurRad="38100" dist="38100" dir="2700000" algn="tl">
+                    <a:srgbClr val="000000">
+                      <a:alpha val="43137"/>
+                    </a:srgbClr>
+                  </a:outerShdw>
+                </a:effectLst>
+              </a:rPr>
+              <a:t>)</a:t>
+            </a:r>
+          </a:p>
+          <a:p>
+            <a:pPr lvl="1"/>
+            <a:r>
+              <a:rPr lang="it-IT" dirty="0"/>
+              <a:t>aggiungere penalità calcolate sulla connettività tra coppie di planning </a:t>
+            </a:r>
+            <a:r>
+              <a:rPr lang="it-IT" dirty="0" err="1"/>
+              <a:t>units</a:t>
+            </a:r>
+            <a:r>
+              <a:rPr lang="it-IT" dirty="0"/>
+              <a:t> (ex: probabilità di dispersione o movimento)(</a:t>
+            </a:r>
+            <a:r>
+              <a:rPr lang="it-IT" dirty="0" err="1">
+                <a:latin typeface="Consolas" panose="020B0609020204030204" pitchFamily="49" charset="0"/>
+              </a:rPr>
+              <a:t>connectivity_penalties</a:t>
+            </a:r>
+            <a:r>
+              <a:rPr lang="it-IT" dirty="0"/>
+              <a:t>)</a:t>
+            </a:r>
+          </a:p>
+        </p:txBody>
+      </p:sp>
+      <p:pic>
+        <p:nvPicPr>
+          <p:cNvPr id="5" name="Immagine 4">
+            <a:extLst>
+              <a:ext uri="{FF2B5EF4-FFF2-40B4-BE49-F238E27FC236}">
+                <a16:creationId xmlns:a16="http://schemas.microsoft.com/office/drawing/2014/main" id="{D01259B6-458C-A391-D249-60FF42532D31}"/>
+              </a:ext>
+            </a:extLst>
+          </p:cNvPr>
+          <p:cNvPicPr>
+            <a:picLocks noChangeAspect="1"/>
+          </p:cNvPicPr>
+          <p:nvPr/>
+        </p:nvPicPr>
+        <p:blipFill rotWithShape="1">
+          <a:blip r:embed="rId2"/>
+          <a:srcRect t="6384" r="22305" b="7018"/>
+          <a:stretch/>
+        </p:blipFill>
+        <p:spPr>
+          <a:xfrm>
+            <a:off x="6420691" y="3548083"/>
+            <a:ext cx="3734424" cy="2779539"/>
+          </a:xfrm>
+          <a:prstGeom prst="rect">
+            <a:avLst/>
+          </a:prstGeom>
+        </p:spPr>
+      </p:pic>
+      <p:pic>
+        <p:nvPicPr>
+          <p:cNvPr id="6" name="Immagine 5">
+            <a:extLst>
+              <a:ext uri="{FF2B5EF4-FFF2-40B4-BE49-F238E27FC236}">
+                <a16:creationId xmlns:a16="http://schemas.microsoft.com/office/drawing/2014/main" id="{3D4E00FC-5803-0E3F-2BFE-07DC157B6867}"/>
+              </a:ext>
+            </a:extLst>
+          </p:cNvPr>
+          <p:cNvPicPr>
+            <a:picLocks noChangeAspect="1"/>
+          </p:cNvPicPr>
+          <p:nvPr/>
+        </p:nvPicPr>
+        <p:blipFill rotWithShape="1">
+          <a:blip r:embed="rId3"/>
+          <a:srcRect r="20797"/>
+          <a:stretch/>
+        </p:blipFill>
+        <p:spPr>
+          <a:xfrm>
+            <a:off x="257840" y="3429000"/>
+            <a:ext cx="3739126" cy="3017706"/>
+          </a:xfrm>
+          <a:prstGeom prst="rect">
+            <a:avLst/>
+          </a:prstGeom>
+        </p:spPr>
+      </p:pic>
+      <p:sp>
+        <p:nvSpPr>
+          <p:cNvPr id="7" name="CasellaDiTesto 6">
+            <a:extLst>
+              <a:ext uri="{FF2B5EF4-FFF2-40B4-BE49-F238E27FC236}">
+                <a16:creationId xmlns:a16="http://schemas.microsoft.com/office/drawing/2014/main" id="{DE2468DD-1C1A-5F43-4E62-A9CEB7961F1E}"/>
+              </a:ext>
+            </a:extLst>
+          </p:cNvPr>
+          <p:cNvSpPr txBox="1"/>
+          <p:nvPr/>
+        </p:nvSpPr>
+        <p:spPr>
+          <a:xfrm>
+            <a:off x="3525888" y="4174709"/>
+            <a:ext cx="2440605" cy="1200329"/>
+          </a:xfrm>
+          <a:prstGeom prst="rect">
+            <a:avLst/>
+          </a:prstGeom>
+          <a:noFill/>
+        </p:spPr>
+        <p:txBody>
+          <a:bodyPr wrap="none" rtlCol="0">
+            <a:spAutoFit/>
+          </a:bodyPr>
+          <a:lstStyle/>
+          <a:p>
+            <a:r>
+              <a:rPr lang="it-IT" dirty="0"/>
+              <a:t>Senza </a:t>
+            </a:r>
+            <a:r>
+              <a:rPr lang="it-IT" dirty="0" err="1"/>
+              <a:t>boundary</a:t>
+            </a:r>
+            <a:r>
+              <a:rPr lang="it-IT" dirty="0"/>
+              <a:t> penalty</a:t>
+            </a:r>
+          </a:p>
+          <a:p>
+            <a:r>
+              <a:rPr lang="it-IT" dirty="0"/>
+              <a:t>370 </a:t>
+            </a:r>
+            <a:r>
+              <a:rPr lang="it-IT" dirty="0" err="1"/>
+              <a:t>PUs</a:t>
+            </a:r>
+            <a:r>
+              <a:rPr lang="it-IT" dirty="0"/>
+              <a:t> selezionate</a:t>
+            </a:r>
+          </a:p>
+          <a:p>
+            <a:r>
+              <a:rPr lang="it-IT" dirty="0"/>
+              <a:t>costo totale: 1399 M€</a:t>
+            </a:r>
+          </a:p>
+          <a:p>
+            <a:r>
+              <a:rPr lang="it-IT" dirty="0" err="1"/>
+              <a:t>boundary</a:t>
+            </a:r>
+            <a:r>
+              <a:rPr lang="it-IT" dirty="0"/>
+              <a:t>: 2,534,032</a:t>
+            </a:r>
+          </a:p>
+        </p:txBody>
+      </p:sp>
+      <p:sp>
+        <p:nvSpPr>
+          <p:cNvPr id="8" name="CasellaDiTesto 7">
+            <a:extLst>
+              <a:ext uri="{FF2B5EF4-FFF2-40B4-BE49-F238E27FC236}">
+                <a16:creationId xmlns:a16="http://schemas.microsoft.com/office/drawing/2014/main" id="{4EBD06FB-AF9D-F888-8011-474DBD5FBB0D}"/>
+              </a:ext>
+            </a:extLst>
+          </p:cNvPr>
+          <p:cNvSpPr txBox="1"/>
+          <p:nvPr/>
+        </p:nvSpPr>
+        <p:spPr>
+          <a:xfrm>
+            <a:off x="9773752" y="4154062"/>
+            <a:ext cx="2266518" cy="1200329"/>
+          </a:xfrm>
+          <a:prstGeom prst="rect">
+            <a:avLst/>
+          </a:prstGeom>
+          <a:noFill/>
+        </p:spPr>
+        <p:txBody>
+          <a:bodyPr wrap="none" rtlCol="0">
+            <a:spAutoFit/>
+          </a:bodyPr>
+          <a:lstStyle/>
+          <a:p>
+            <a:r>
+              <a:rPr lang="it-IT" dirty="0"/>
+              <a:t>Con </a:t>
+            </a:r>
+            <a:r>
+              <a:rPr lang="it-IT" dirty="0" err="1"/>
+              <a:t>boundary</a:t>
+            </a:r>
+            <a:r>
+              <a:rPr lang="it-IT" dirty="0"/>
+              <a:t> penalty</a:t>
+            </a:r>
+          </a:p>
+          <a:p>
+            <a:r>
+              <a:rPr lang="it-IT" dirty="0"/>
+              <a:t>424 </a:t>
+            </a:r>
+            <a:r>
+              <a:rPr lang="it-IT" dirty="0" err="1"/>
+              <a:t>PUs</a:t>
+            </a:r>
+            <a:r>
+              <a:rPr lang="it-IT" dirty="0"/>
+              <a:t> selezionate</a:t>
+            </a:r>
+          </a:p>
+          <a:p>
+            <a:r>
+              <a:rPr lang="it-IT" dirty="0"/>
+              <a:t>costo totale: 1519 M€</a:t>
+            </a:r>
+          </a:p>
+          <a:p>
+            <a:r>
+              <a:rPr lang="it-IT" dirty="0" err="1"/>
+              <a:t>boundary</a:t>
+            </a:r>
+            <a:r>
+              <a:rPr lang="it-IT" dirty="0"/>
+              <a:t>: 1,711,785</a:t>
+            </a:r>
+          </a:p>
+        </p:txBody>
+      </p:sp>
+    </p:spTree>
+    <p:extLst>
+      <p:ext uri="{BB962C8B-B14F-4D97-AF65-F5344CB8AC3E}">
+        <p14:creationId xmlns:p14="http://schemas.microsoft.com/office/powerpoint/2010/main" val="111030237"/>
+      </p:ext>
+    </p:extLst>
+  </p:cSld>
+  <p:clrMapOvr>
+    <a:masterClrMapping/>
+  </p:clrMapOvr>
+</p:sld>
+</file>
+
+<file path=ppt/slides/slide16.xml><?xml version="1.0" encoding="utf-8"?>
+<p:sld xmlns:a="http://schemas.openxmlformats.org/drawingml/2006/main" xmlns:r="http://schemas.openxmlformats.org/officeDocument/2006/relationships" xmlns:p="http://schemas.openxmlformats.org/presentationml/2006/main">
+  <p:cSld>
+    <p:spTree>
+      <p:nvGrpSpPr>
+        <p:cNvPr id="1" name=""/>
+        <p:cNvGrpSpPr/>
+        <p:nvPr/>
+      </p:nvGrpSpPr>
+      <p:grpSpPr>
+        <a:xfrm>
+          <a:off x="0" y="0"/>
+          <a:ext cx="0" cy="0"/>
+          <a:chOff x="0" y="0"/>
+          <a:chExt cx="0" cy="0"/>
+        </a:xfrm>
+      </p:grpSpPr>
+      <p:sp>
+        <p:nvSpPr>
+          <p:cNvPr id="2" name="Titolo 1">
+            <a:extLst>
+              <a:ext uri="{FF2B5EF4-FFF2-40B4-BE49-F238E27FC236}">
+                <a16:creationId xmlns:a16="http://schemas.microsoft.com/office/drawing/2014/main" id="{77E1C6D2-6418-6335-D181-7FBC5925797D}"/>
+              </a:ext>
+            </a:extLst>
+          </p:cNvPr>
+          <p:cNvSpPr>
+            <a:spLocks noGrp="1"/>
+          </p:cNvSpPr>
+          <p:nvPr>
+            <p:ph type="title"/>
+          </p:nvPr>
+        </p:nvSpPr>
+        <p:spPr>
+          <a:xfrm>
+            <a:off x="838200" y="146596"/>
+            <a:ext cx="10515600" cy="871500"/>
+          </a:xfrm>
+        </p:spPr>
+        <p:txBody>
+          <a:bodyPr>
+            <a:normAutofit/>
+          </a:bodyPr>
+          <a:lstStyle/>
+          <a:p>
+            <a:r>
+              <a:rPr lang="it-IT" sz="4000" dirty="0"/>
+              <a:t>«Minimum-set» vs «maximum-</a:t>
+            </a:r>
+            <a:r>
+              <a:rPr lang="it-IT" sz="4000" dirty="0" err="1"/>
+              <a:t>representation</a:t>
+            </a:r>
+            <a:r>
+              <a:rPr lang="it-IT" sz="4000" dirty="0"/>
+              <a:t>»</a:t>
+            </a:r>
+          </a:p>
+        </p:txBody>
+      </p:sp>
+      <p:sp>
+        <p:nvSpPr>
+          <p:cNvPr id="3" name="Segnaposto contenuto 2">
+            <a:extLst>
+              <a:ext uri="{FF2B5EF4-FFF2-40B4-BE49-F238E27FC236}">
+                <a16:creationId xmlns:a16="http://schemas.microsoft.com/office/drawing/2014/main" id="{66C7E2FE-3664-CDB5-6E46-D2F41D66DA38}"/>
+              </a:ext>
+            </a:extLst>
+          </p:cNvPr>
+          <p:cNvSpPr>
+            <a:spLocks noGrp="1"/>
+          </p:cNvSpPr>
+          <p:nvPr>
+            <p:ph idx="1"/>
+          </p:nvPr>
+        </p:nvSpPr>
+        <p:spPr>
+          <a:xfrm>
+            <a:off x="838200" y="1411551"/>
+            <a:ext cx="10515600" cy="1882066"/>
+          </a:xfrm>
+        </p:spPr>
+        <p:txBody>
+          <a:bodyPr/>
+          <a:lstStyle/>
+          <a:p>
+            <a:r>
+              <a:rPr lang="it-IT" dirty="0"/>
+              <a:t>«Minimum-set»: raggiungere tutti gli obiettivi (</a:t>
+            </a:r>
+            <a:r>
+              <a:rPr lang="it-IT" i="1" dirty="0"/>
+              <a:t>target</a:t>
+            </a:r>
+            <a:r>
+              <a:rPr lang="it-IT" dirty="0"/>
+              <a:t>) di conservazione al minor costo</a:t>
+            </a:r>
+          </a:p>
+          <a:p>
+            <a:r>
+              <a:rPr lang="it-IT" dirty="0"/>
+              <a:t>«Maximum-</a:t>
+            </a:r>
+            <a:r>
+              <a:rPr lang="it-IT" dirty="0" err="1"/>
+              <a:t>representation</a:t>
+            </a:r>
+            <a:r>
+              <a:rPr lang="it-IT" dirty="0"/>
+              <a:t>»: raggiungere il maggior numero di obiettivi di conservazione senza superare un </a:t>
+            </a:r>
+            <a:r>
+              <a:rPr lang="it-IT" i="1" dirty="0"/>
+              <a:t>budget</a:t>
+            </a:r>
+            <a:r>
+              <a:rPr lang="it-IT" dirty="0"/>
+              <a:t> prefissato</a:t>
+            </a:r>
+          </a:p>
+        </p:txBody>
+      </p:sp>
+      <p:pic>
+        <p:nvPicPr>
+          <p:cNvPr id="4" name="Immagine 3">
+            <a:extLst>
+              <a:ext uri="{FF2B5EF4-FFF2-40B4-BE49-F238E27FC236}">
+                <a16:creationId xmlns:a16="http://schemas.microsoft.com/office/drawing/2014/main" id="{9E99F765-A534-4F5E-39A8-FB38B73874E7}"/>
+              </a:ext>
+            </a:extLst>
+          </p:cNvPr>
+          <p:cNvPicPr>
+            <a:picLocks noChangeAspect="1"/>
+          </p:cNvPicPr>
+          <p:nvPr/>
+        </p:nvPicPr>
+        <p:blipFill rotWithShape="1">
+          <a:blip r:embed="rId2"/>
+          <a:srcRect r="20797"/>
+          <a:stretch/>
+        </p:blipFill>
+        <p:spPr>
+          <a:xfrm>
+            <a:off x="257840" y="3429000"/>
+            <a:ext cx="3739126" cy="3017706"/>
+          </a:xfrm>
+          <a:prstGeom prst="rect">
+            <a:avLst/>
+          </a:prstGeom>
+        </p:spPr>
+      </p:pic>
+      <p:sp>
+        <p:nvSpPr>
+          <p:cNvPr id="5" name="CasellaDiTesto 4">
+            <a:extLst>
+              <a:ext uri="{FF2B5EF4-FFF2-40B4-BE49-F238E27FC236}">
+                <a16:creationId xmlns:a16="http://schemas.microsoft.com/office/drawing/2014/main" id="{368D9F28-BEE3-F5F8-2F42-065A33970F04}"/>
+              </a:ext>
+            </a:extLst>
+          </p:cNvPr>
+          <p:cNvSpPr txBox="1"/>
+          <p:nvPr/>
+        </p:nvSpPr>
+        <p:spPr>
+          <a:xfrm>
+            <a:off x="3525888" y="4174709"/>
+            <a:ext cx="2492798" cy="1200329"/>
+          </a:xfrm>
+          <a:prstGeom prst="rect">
+            <a:avLst/>
+          </a:prstGeom>
+          <a:noFill/>
+        </p:spPr>
+        <p:txBody>
+          <a:bodyPr wrap="none" rtlCol="0">
+            <a:spAutoFit/>
+          </a:bodyPr>
+          <a:lstStyle/>
+          <a:p>
+            <a:r>
+              <a:rPr lang="it-IT" dirty="0"/>
+              <a:t>Minimum-set</a:t>
+            </a:r>
+          </a:p>
+          <a:p>
+            <a:r>
+              <a:rPr lang="it-IT" dirty="0"/>
+              <a:t>370 </a:t>
+            </a:r>
+            <a:r>
+              <a:rPr lang="it-IT" dirty="0" err="1"/>
+              <a:t>PUs</a:t>
+            </a:r>
+            <a:r>
+              <a:rPr lang="it-IT" dirty="0"/>
+              <a:t> selezionate</a:t>
+            </a:r>
+          </a:p>
+          <a:p>
+            <a:r>
+              <a:rPr lang="it-IT" dirty="0"/>
+              <a:t>costo totale: 1399 M€</a:t>
+            </a:r>
+          </a:p>
+          <a:p>
+            <a:r>
+              <a:rPr lang="it-IT" dirty="0"/>
+              <a:t>Target raggiunti 398/398</a:t>
+            </a:r>
+          </a:p>
+        </p:txBody>
+      </p:sp>
+      <p:pic>
+        <p:nvPicPr>
+          <p:cNvPr id="7" name="Immagine 6">
+            <a:extLst>
+              <a:ext uri="{FF2B5EF4-FFF2-40B4-BE49-F238E27FC236}">
+                <a16:creationId xmlns:a16="http://schemas.microsoft.com/office/drawing/2014/main" id="{C9018FFB-6051-D59B-1D23-63C6E856E4AD}"/>
+              </a:ext>
+            </a:extLst>
+          </p:cNvPr>
+          <p:cNvPicPr>
+            <a:picLocks noChangeAspect="1"/>
+          </p:cNvPicPr>
+          <p:nvPr/>
+        </p:nvPicPr>
+        <p:blipFill>
+          <a:blip r:embed="rId3"/>
+          <a:stretch>
+            <a:fillRect/>
+          </a:stretch>
+        </p:blipFill>
+        <p:spPr>
+          <a:xfrm>
+            <a:off x="6198369" y="3324811"/>
+            <a:ext cx="4830992" cy="3226083"/>
+          </a:xfrm>
+          <a:prstGeom prst="rect">
+            <a:avLst/>
+          </a:prstGeom>
+        </p:spPr>
+      </p:pic>
+      <p:sp>
+        <p:nvSpPr>
+          <p:cNvPr id="8" name="CasellaDiTesto 7">
+            <a:extLst>
+              <a:ext uri="{FF2B5EF4-FFF2-40B4-BE49-F238E27FC236}">
+                <a16:creationId xmlns:a16="http://schemas.microsoft.com/office/drawing/2014/main" id="{A3663079-9C7E-1500-0207-CFDA24A808B5}"/>
+              </a:ext>
+            </a:extLst>
+          </p:cNvPr>
+          <p:cNvSpPr txBox="1"/>
+          <p:nvPr/>
+        </p:nvSpPr>
+        <p:spPr>
+          <a:xfrm>
+            <a:off x="9595528" y="4085609"/>
+            <a:ext cx="2591607" cy="1200329"/>
+          </a:xfrm>
+          <a:prstGeom prst="rect">
+            <a:avLst/>
+          </a:prstGeom>
+          <a:noFill/>
+        </p:spPr>
+        <p:txBody>
+          <a:bodyPr wrap="none" rtlCol="0">
+            <a:spAutoFit/>
+          </a:bodyPr>
+          <a:lstStyle/>
+          <a:p>
+            <a:r>
+              <a:rPr lang="it-IT" dirty="0"/>
+              <a:t>Maximum-</a:t>
+            </a:r>
+            <a:r>
+              <a:rPr lang="it-IT" dirty="0" err="1"/>
+              <a:t>representation</a:t>
+            </a:r>
+            <a:endParaRPr lang="it-IT" dirty="0"/>
+          </a:p>
+          <a:p>
+            <a:r>
+              <a:rPr lang="it-IT" dirty="0"/>
+              <a:t>371 </a:t>
+            </a:r>
+            <a:r>
+              <a:rPr lang="it-IT" dirty="0" err="1"/>
+              <a:t>PUs</a:t>
+            </a:r>
+            <a:r>
+              <a:rPr lang="it-IT" dirty="0"/>
+              <a:t> selezionate</a:t>
+            </a:r>
+          </a:p>
+          <a:p>
+            <a:r>
+              <a:rPr lang="it-IT" dirty="0"/>
+              <a:t>costo totale: 996 M€</a:t>
+            </a:r>
+          </a:p>
+          <a:p>
+            <a:r>
+              <a:rPr lang="it-IT" dirty="0"/>
+              <a:t>Target raggiunti 363/398</a:t>
+            </a:r>
+          </a:p>
+        </p:txBody>
+      </p:sp>
+    </p:spTree>
+    <p:extLst>
+      <p:ext uri="{BB962C8B-B14F-4D97-AF65-F5344CB8AC3E}">
+        <p14:creationId xmlns:p14="http://schemas.microsoft.com/office/powerpoint/2010/main" val="3729454703"/>
+      </p:ext>
+    </p:extLst>
+  </p:cSld>
+  <p:clrMapOvr>
+    <a:masterClrMapping/>
+  </p:clrMapOvr>
+</p:sld>
+</file>
+
+<file path=ppt/slides/slide17.xml><?xml version="1.0" encoding="utf-8"?>
+<p:sld xmlns:a="http://schemas.openxmlformats.org/drawingml/2006/main" xmlns:r="http://schemas.openxmlformats.org/officeDocument/2006/relationships" xmlns:p="http://schemas.openxmlformats.org/presentationml/2006/main">
+  <p:cSld>
+    <p:spTree>
+      <p:nvGrpSpPr>
+        <p:cNvPr id="1" name=""/>
+        <p:cNvGrpSpPr/>
+        <p:nvPr/>
+      </p:nvGrpSpPr>
+      <p:grpSpPr>
+        <a:xfrm>
+          <a:off x="0" y="0"/>
+          <a:ext cx="0" cy="0"/>
+          <a:chOff x="0" y="0"/>
+          <a:chExt cx="0" cy="0"/>
+        </a:xfrm>
+      </p:grpSpPr>
+      <p:sp>
+        <p:nvSpPr>
+          <p:cNvPr id="2" name="Titolo 1">
+            <a:extLst>
+              <a:ext uri="{FF2B5EF4-FFF2-40B4-BE49-F238E27FC236}">
+                <a16:creationId xmlns:a16="http://schemas.microsoft.com/office/drawing/2014/main" id="{77E1C6D2-6418-6335-D181-7FBC5925797D}"/>
+              </a:ext>
+            </a:extLst>
+          </p:cNvPr>
+          <p:cNvSpPr>
+            <a:spLocks noGrp="1"/>
+          </p:cNvSpPr>
+          <p:nvPr>
+            <p:ph type="title"/>
+          </p:nvPr>
+        </p:nvSpPr>
+        <p:spPr>
+          <a:xfrm>
+            <a:off x="838200" y="146596"/>
+            <a:ext cx="10515600" cy="871500"/>
+          </a:xfrm>
+        </p:spPr>
+        <p:txBody>
+          <a:bodyPr>
+            <a:normAutofit/>
+          </a:bodyPr>
+          <a:lstStyle/>
+          <a:p>
+            <a:r>
+              <a:rPr lang="it-IT" sz="4000" dirty="0"/>
+              <a:t>«Minimum-set» vs «maximum-</a:t>
+            </a:r>
+            <a:r>
+              <a:rPr lang="it-IT" sz="4000" dirty="0" err="1"/>
+              <a:t>representation</a:t>
+            </a:r>
+            <a:r>
+              <a:rPr lang="it-IT" sz="4000" dirty="0"/>
+              <a:t>»</a:t>
+            </a:r>
+          </a:p>
+        </p:txBody>
+      </p:sp>
+      <p:pic>
+        <p:nvPicPr>
+          <p:cNvPr id="4" name="Immagine 3">
+            <a:extLst>
+              <a:ext uri="{FF2B5EF4-FFF2-40B4-BE49-F238E27FC236}">
+                <a16:creationId xmlns:a16="http://schemas.microsoft.com/office/drawing/2014/main" id="{9E99F765-A534-4F5E-39A8-FB38B73874E7}"/>
+              </a:ext>
+            </a:extLst>
+          </p:cNvPr>
+          <p:cNvPicPr>
+            <a:picLocks noChangeAspect="1"/>
+          </p:cNvPicPr>
+          <p:nvPr/>
+        </p:nvPicPr>
+        <p:blipFill rotWithShape="1">
+          <a:blip r:embed="rId2"/>
+          <a:srcRect r="20797"/>
+          <a:stretch/>
+        </p:blipFill>
+        <p:spPr>
+          <a:xfrm>
+            <a:off x="257840" y="3429000"/>
+            <a:ext cx="3739126" cy="3017706"/>
+          </a:xfrm>
+          <a:prstGeom prst="rect">
+            <a:avLst/>
+          </a:prstGeom>
+        </p:spPr>
+      </p:pic>
+      <p:sp>
+        <p:nvSpPr>
+          <p:cNvPr id="5" name="CasellaDiTesto 4">
+            <a:extLst>
+              <a:ext uri="{FF2B5EF4-FFF2-40B4-BE49-F238E27FC236}">
+                <a16:creationId xmlns:a16="http://schemas.microsoft.com/office/drawing/2014/main" id="{368D9F28-BEE3-F5F8-2F42-065A33970F04}"/>
+              </a:ext>
+            </a:extLst>
+          </p:cNvPr>
+          <p:cNvSpPr txBox="1"/>
+          <p:nvPr/>
+        </p:nvSpPr>
+        <p:spPr>
+          <a:xfrm>
+            <a:off x="3525888" y="4174709"/>
+            <a:ext cx="2492798" cy="1200329"/>
+          </a:xfrm>
+          <a:prstGeom prst="rect">
+            <a:avLst/>
+          </a:prstGeom>
+          <a:noFill/>
+        </p:spPr>
+        <p:txBody>
+          <a:bodyPr wrap="none" rtlCol="0">
+            <a:spAutoFit/>
+          </a:bodyPr>
+          <a:lstStyle/>
+          <a:p>
+            <a:r>
+              <a:rPr lang="it-IT" dirty="0"/>
+              <a:t>Minimum-set</a:t>
+            </a:r>
+          </a:p>
+          <a:p>
+            <a:r>
+              <a:rPr lang="it-IT" dirty="0"/>
+              <a:t>370 </a:t>
+            </a:r>
+            <a:r>
+              <a:rPr lang="it-IT" dirty="0" err="1"/>
+              <a:t>PUs</a:t>
+            </a:r>
+            <a:r>
+              <a:rPr lang="it-IT" dirty="0"/>
+              <a:t> selezionate</a:t>
+            </a:r>
+          </a:p>
+          <a:p>
+            <a:r>
+              <a:rPr lang="it-IT" dirty="0"/>
+              <a:t>costo totale: 1399 M€</a:t>
+            </a:r>
+          </a:p>
+          <a:p>
+            <a:r>
+              <a:rPr lang="it-IT" dirty="0"/>
+              <a:t>Target raggiunti 398/398</a:t>
+            </a:r>
+          </a:p>
+        </p:txBody>
+      </p:sp>
+      <p:pic>
+        <p:nvPicPr>
+          <p:cNvPr id="7" name="Immagine 6">
+            <a:extLst>
+              <a:ext uri="{FF2B5EF4-FFF2-40B4-BE49-F238E27FC236}">
+                <a16:creationId xmlns:a16="http://schemas.microsoft.com/office/drawing/2014/main" id="{C9018FFB-6051-D59B-1D23-63C6E856E4AD}"/>
+              </a:ext>
+            </a:extLst>
+          </p:cNvPr>
+          <p:cNvPicPr>
+            <a:picLocks noChangeAspect="1"/>
+          </p:cNvPicPr>
+          <p:nvPr/>
+        </p:nvPicPr>
+        <p:blipFill>
+          <a:blip r:embed="rId3"/>
+          <a:stretch>
+            <a:fillRect/>
+          </a:stretch>
+        </p:blipFill>
+        <p:spPr>
+          <a:xfrm>
+            <a:off x="6198369" y="3324811"/>
+            <a:ext cx="4830992" cy="3226083"/>
+          </a:xfrm>
+          <a:prstGeom prst="rect">
+            <a:avLst/>
+          </a:prstGeom>
+        </p:spPr>
+      </p:pic>
+      <p:sp>
+        <p:nvSpPr>
+          <p:cNvPr id="8" name="CasellaDiTesto 7">
+            <a:extLst>
+              <a:ext uri="{FF2B5EF4-FFF2-40B4-BE49-F238E27FC236}">
+                <a16:creationId xmlns:a16="http://schemas.microsoft.com/office/drawing/2014/main" id="{A3663079-9C7E-1500-0207-CFDA24A808B5}"/>
+              </a:ext>
+            </a:extLst>
+          </p:cNvPr>
+          <p:cNvSpPr txBox="1"/>
+          <p:nvPr/>
+        </p:nvSpPr>
+        <p:spPr>
+          <a:xfrm>
+            <a:off x="9595528" y="4085609"/>
+            <a:ext cx="2591607" cy="1200329"/>
+          </a:xfrm>
+          <a:prstGeom prst="rect">
+            <a:avLst/>
+          </a:prstGeom>
+          <a:noFill/>
+        </p:spPr>
+        <p:txBody>
+          <a:bodyPr wrap="none" rtlCol="0">
+            <a:spAutoFit/>
+          </a:bodyPr>
+          <a:lstStyle/>
+          <a:p>
+            <a:r>
+              <a:rPr lang="it-IT" dirty="0"/>
+              <a:t>Maximum-</a:t>
+            </a:r>
+            <a:r>
+              <a:rPr lang="it-IT" dirty="0" err="1"/>
+              <a:t>representation</a:t>
+            </a:r>
+            <a:endParaRPr lang="it-IT" dirty="0"/>
+          </a:p>
+          <a:p>
+            <a:r>
+              <a:rPr lang="it-IT" dirty="0"/>
+              <a:t>371 </a:t>
+            </a:r>
+            <a:r>
+              <a:rPr lang="it-IT" dirty="0" err="1"/>
+              <a:t>PUs</a:t>
+            </a:r>
+            <a:r>
+              <a:rPr lang="it-IT" dirty="0"/>
+              <a:t> selezionate</a:t>
+            </a:r>
+          </a:p>
+          <a:p>
+            <a:r>
+              <a:rPr lang="it-IT" dirty="0"/>
+              <a:t>costo totale: 996 M€</a:t>
+            </a:r>
+          </a:p>
+          <a:p>
+            <a:r>
+              <a:rPr lang="it-IT" dirty="0"/>
+              <a:t>Target raggiunti 363/398</a:t>
+            </a:r>
+          </a:p>
+        </p:txBody>
+      </p:sp>
+      <p:pic>
+        <p:nvPicPr>
+          <p:cNvPr id="11" name="Immagine 10">
+            <a:extLst>
+              <a:ext uri="{FF2B5EF4-FFF2-40B4-BE49-F238E27FC236}">
+                <a16:creationId xmlns:a16="http://schemas.microsoft.com/office/drawing/2014/main" id="{56107546-CCFC-B486-0F59-B4ED920043B3}"/>
+              </a:ext>
+            </a:extLst>
+          </p:cNvPr>
+          <p:cNvPicPr>
+            <a:picLocks noChangeAspect="1"/>
+          </p:cNvPicPr>
+          <p:nvPr/>
+        </p:nvPicPr>
+        <p:blipFill rotWithShape="1">
+          <a:blip r:embed="rId4"/>
+          <a:srcRect l="2641" t="3551" r="1871" b="4572"/>
+          <a:stretch/>
+        </p:blipFill>
+        <p:spPr>
+          <a:xfrm>
+            <a:off x="3838379" y="1080671"/>
+            <a:ext cx="3157224" cy="2077376"/>
+          </a:xfrm>
+          <a:prstGeom prst="rect">
+            <a:avLst/>
+          </a:prstGeom>
+        </p:spPr>
+      </p:pic>
+      <p:sp>
+        <p:nvSpPr>
+          <p:cNvPr id="12" name="Freccia curva 11">
+            <a:extLst>
+              <a:ext uri="{FF2B5EF4-FFF2-40B4-BE49-F238E27FC236}">
+                <a16:creationId xmlns:a16="http://schemas.microsoft.com/office/drawing/2014/main" id="{ED3B98CD-4F99-E80E-8895-605D625B2395}"/>
+              </a:ext>
+            </a:extLst>
+          </p:cNvPr>
+          <p:cNvSpPr/>
+          <p:nvPr/>
+        </p:nvSpPr>
+        <p:spPr>
+          <a:xfrm rot="10800000">
+            <a:off x="3320249" y="3103041"/>
+            <a:ext cx="2878120" cy="800715"/>
+          </a:xfrm>
+          <a:prstGeom prst="bentArrow">
+            <a:avLst>
+              <a:gd name="adj1" fmla="val 25000"/>
+              <a:gd name="adj2" fmla="val 19456"/>
+              <a:gd name="adj3" fmla="val 25000"/>
+              <a:gd name="adj4" fmla="val 43750"/>
+            </a:avLst>
+          </a:prstGeom>
+          <a:solidFill>
+            <a:srgbClr val="B5B682"/>
+          </a:solidFill>
+          <a:ln>
+            <a:solidFill>
+              <a:srgbClr val="B5B682"/>
+            </a:solidFill>
+          </a:ln>
+        </p:spPr>
+        <p:style>
+          <a:lnRef idx="2">
+            <a:schemeClr val="accent1">
+              <a:shade val="15000"/>
+            </a:schemeClr>
+          </a:lnRef>
+          <a:fillRef idx="1">
+            <a:schemeClr val="accent1"/>
+          </a:fillRef>
+          <a:effectRef idx="0">
+            <a:schemeClr val="accent1"/>
+          </a:effectRef>
+          <a:fontRef idx="minor">
+            <a:schemeClr val="lt1"/>
+          </a:fontRef>
+        </p:style>
+        <p:txBody>
+          <a:bodyPr rtlCol="0" anchor="ctr"/>
+          <a:lstStyle/>
+          <a:p>
+            <a:pPr algn="ctr"/>
+            <a:endParaRPr lang="it-IT">
+              <a:solidFill>
+                <a:schemeClr val="tx1"/>
+              </a:solidFill>
+            </a:endParaRPr>
+          </a:p>
+        </p:txBody>
+      </p:sp>
+      <p:sp>
+        <p:nvSpPr>
+          <p:cNvPr id="13" name="Freccia curva 12">
+            <a:extLst>
+              <a:ext uri="{FF2B5EF4-FFF2-40B4-BE49-F238E27FC236}">
+                <a16:creationId xmlns:a16="http://schemas.microsoft.com/office/drawing/2014/main" id="{FB2E9E67-22C9-2CA0-625A-C1B964F22042}"/>
+              </a:ext>
+            </a:extLst>
+          </p:cNvPr>
+          <p:cNvSpPr/>
+          <p:nvPr/>
+        </p:nvSpPr>
+        <p:spPr>
+          <a:xfrm rot="5400000">
+            <a:off x="5572533" y="1052757"/>
+            <a:ext cx="2199118" cy="2815267"/>
+          </a:xfrm>
+          <a:prstGeom prst="bentArrow">
+            <a:avLst>
+              <a:gd name="adj1" fmla="val 6097"/>
+              <a:gd name="adj2" fmla="val 7392"/>
+              <a:gd name="adj3" fmla="val 8340"/>
+              <a:gd name="adj4" fmla="val 44070"/>
+            </a:avLst>
+          </a:prstGeom>
+          <a:solidFill>
+            <a:srgbClr val="033F63"/>
+          </a:solidFill>
+          <a:ln>
+            <a:solidFill>
+              <a:srgbClr val="033F63"/>
+            </a:solidFill>
+          </a:ln>
+        </p:spPr>
+        <p:style>
+          <a:lnRef idx="2">
+            <a:schemeClr val="accent1">
+              <a:shade val="15000"/>
+            </a:schemeClr>
+          </a:lnRef>
+          <a:fillRef idx="1">
+            <a:schemeClr val="accent1"/>
+          </a:fillRef>
+          <a:effectRef idx="0">
+            <a:schemeClr val="accent1"/>
+          </a:effectRef>
+          <a:fontRef idx="minor">
+            <a:schemeClr val="lt1"/>
+          </a:fontRef>
+        </p:style>
+        <p:txBody>
+          <a:bodyPr rtlCol="0" anchor="ctr"/>
+          <a:lstStyle/>
+          <a:p>
+            <a:pPr algn="ctr"/>
+            <a:endParaRPr lang="it-IT">
+              <a:solidFill>
+                <a:schemeClr val="tx1"/>
+              </a:solidFill>
+            </a:endParaRPr>
+          </a:p>
+        </p:txBody>
+      </p:sp>
+    </p:spTree>
+    <p:extLst>
+      <p:ext uri="{BB962C8B-B14F-4D97-AF65-F5344CB8AC3E}">
+        <p14:creationId xmlns:p14="http://schemas.microsoft.com/office/powerpoint/2010/main" val="2509646461"/>
+      </p:ext>
+    </p:extLst>
+  </p:cSld>
+  <p:clrMapOvr>
+    <a:masterClrMapping/>
+  </p:clrMapOvr>
+</p:sld>
+</file>
+
+<file path=ppt/slides/slide18.xml><?xml version="1.0" encoding="utf-8"?>
+<p:sld xmlns:a="http://schemas.openxmlformats.org/drawingml/2006/main" xmlns:r="http://schemas.openxmlformats.org/officeDocument/2006/relationships" xmlns:p="http://schemas.openxmlformats.org/presentationml/2006/main">
+  <p:cSld>
+    <p:spTree>
+      <p:nvGrpSpPr>
+        <p:cNvPr id="1" name=""/>
+        <p:cNvGrpSpPr/>
+        <p:nvPr/>
+      </p:nvGrpSpPr>
+      <p:grpSpPr>
+        <a:xfrm>
+          <a:off x="0" y="0"/>
+          <a:ext cx="0" cy="0"/>
+          <a:chOff x="0" y="0"/>
+          <a:chExt cx="0" cy="0"/>
+        </a:xfrm>
+      </p:grpSpPr>
+      <p:pic>
+        <p:nvPicPr>
+          <p:cNvPr id="9" name="Immagine 8">
+            <a:extLst>
+              <a:ext uri="{FF2B5EF4-FFF2-40B4-BE49-F238E27FC236}">
+                <a16:creationId xmlns:a16="http://schemas.microsoft.com/office/drawing/2014/main" id="{CED98FC7-DEF0-BA12-57E7-3B0E50C8B4A6}"/>
+              </a:ext>
+            </a:extLst>
+          </p:cNvPr>
+          <p:cNvPicPr>
+            <a:picLocks noChangeAspect="1"/>
+          </p:cNvPicPr>
+          <p:nvPr/>
+        </p:nvPicPr>
+        <p:blipFill rotWithShape="1">
+          <a:blip r:embed="rId2"/>
+          <a:srcRect t="6631" r="21603" b="6961"/>
+          <a:stretch/>
+        </p:blipFill>
+        <p:spPr>
+          <a:xfrm>
+            <a:off x="6012730" y="2666610"/>
+            <a:ext cx="4138440" cy="3046034"/>
+          </a:xfrm>
+          <a:prstGeom prst="rect">
+            <a:avLst/>
+          </a:prstGeom>
+        </p:spPr>
+      </p:pic>
+      <p:sp>
+        <p:nvSpPr>
+          <p:cNvPr id="2" name="Titolo 1">
+            <a:extLst>
+              <a:ext uri="{FF2B5EF4-FFF2-40B4-BE49-F238E27FC236}">
+                <a16:creationId xmlns:a16="http://schemas.microsoft.com/office/drawing/2014/main" id="{77E1C6D2-6418-6335-D181-7FBC5925797D}"/>
+              </a:ext>
+            </a:extLst>
+          </p:cNvPr>
+          <p:cNvSpPr>
+            <a:spLocks noGrp="1"/>
+          </p:cNvSpPr>
+          <p:nvPr>
+            <p:ph type="title"/>
+          </p:nvPr>
+        </p:nvSpPr>
+        <p:spPr>
+          <a:xfrm>
+            <a:off x="838200" y="365126"/>
+            <a:ext cx="10515600" cy="842238"/>
+          </a:xfrm>
+        </p:spPr>
+        <p:txBody>
+          <a:bodyPr>
+            <a:normAutofit/>
+          </a:bodyPr>
+          <a:lstStyle/>
+          <a:p>
+            <a:r>
+              <a:rPr lang="it-IT" sz="4000" dirty="0"/>
+              <a:t>Planning </a:t>
+            </a:r>
+            <a:r>
+              <a:rPr lang="it-IT" sz="4000" dirty="0" err="1"/>
+              <a:t>units</a:t>
+            </a:r>
+            <a:r>
+              <a:rPr lang="it-IT" sz="4000" dirty="0"/>
+              <a:t> «bloccate»</a:t>
+            </a:r>
+          </a:p>
+        </p:txBody>
+      </p:sp>
+      <p:sp>
+        <p:nvSpPr>
+          <p:cNvPr id="3" name="Segnaposto contenuto 2">
+            <a:extLst>
+              <a:ext uri="{FF2B5EF4-FFF2-40B4-BE49-F238E27FC236}">
+                <a16:creationId xmlns:a16="http://schemas.microsoft.com/office/drawing/2014/main" id="{66C7E2FE-3664-CDB5-6E46-D2F41D66DA38}"/>
+              </a:ext>
+            </a:extLst>
+          </p:cNvPr>
+          <p:cNvSpPr>
+            <a:spLocks noGrp="1"/>
+          </p:cNvSpPr>
+          <p:nvPr>
+            <p:ph idx="1"/>
+          </p:nvPr>
+        </p:nvSpPr>
+        <p:spPr>
+          <a:xfrm>
+            <a:off x="838199" y="1411550"/>
+            <a:ext cx="11133667" cy="1058273"/>
+          </a:xfrm>
+        </p:spPr>
+        <p:txBody>
+          <a:bodyPr>
+            <a:normAutofit/>
+          </a:bodyPr>
+          <a:lstStyle/>
+          <a:p>
+            <a:pPr marL="0" indent="0">
+              <a:buNone/>
+            </a:pPr>
+            <a:r>
+              <a:rPr lang="it-IT" sz="2400" dirty="0"/>
+              <a:t>Selezionare a priori planning </a:t>
+            </a:r>
+            <a:r>
+              <a:rPr lang="it-IT" sz="2400" dirty="0" err="1"/>
+              <a:t>units</a:t>
+            </a:r>
+            <a:r>
+              <a:rPr lang="it-IT" sz="2400" dirty="0"/>
+              <a:t> da includere (</a:t>
+            </a:r>
+            <a:r>
+              <a:rPr lang="it-IT" sz="2400" dirty="0" err="1">
+                <a:latin typeface="Consolas" panose="020B0609020204030204" pitchFamily="49" charset="0"/>
+              </a:rPr>
+              <a:t>locked</a:t>
+            </a:r>
+            <a:r>
+              <a:rPr lang="it-IT" sz="2400" dirty="0">
+                <a:latin typeface="Consolas" panose="020B0609020204030204" pitchFamily="49" charset="0"/>
+              </a:rPr>
+              <a:t>-in</a:t>
+            </a:r>
+            <a:r>
+              <a:rPr lang="it-IT" sz="2400" dirty="0"/>
+              <a:t>)</a:t>
+            </a:r>
+            <a:br>
+              <a:rPr lang="it-IT" sz="2400" dirty="0"/>
+            </a:br>
+            <a:r>
+              <a:rPr lang="it-IT" sz="2400" dirty="0"/>
+              <a:t>o escludere (</a:t>
+            </a:r>
+            <a:r>
+              <a:rPr lang="it-IT" sz="2400" dirty="0" err="1">
+                <a:latin typeface="Consolas" panose="020B0609020204030204" pitchFamily="49" charset="0"/>
+              </a:rPr>
+              <a:t>locked</a:t>
+            </a:r>
+            <a:r>
+              <a:rPr lang="it-IT" sz="2400" dirty="0">
+                <a:latin typeface="Consolas" panose="020B0609020204030204" pitchFamily="49" charset="0"/>
+              </a:rPr>
+              <a:t>-out</a:t>
+            </a:r>
+            <a:r>
+              <a:rPr lang="it-IT" sz="2400" dirty="0"/>
+              <a:t>) dalla selezione</a:t>
+            </a:r>
+          </a:p>
+        </p:txBody>
+      </p:sp>
+      <p:pic>
+        <p:nvPicPr>
+          <p:cNvPr id="5" name="Immagine 4">
+            <a:extLst>
+              <a:ext uri="{FF2B5EF4-FFF2-40B4-BE49-F238E27FC236}">
+                <a16:creationId xmlns:a16="http://schemas.microsoft.com/office/drawing/2014/main" id="{59D33BE0-796C-3465-0E16-7E172437BF2B}"/>
+              </a:ext>
+            </a:extLst>
+          </p:cNvPr>
+          <p:cNvPicPr>
+            <a:picLocks noChangeAspect="1"/>
+          </p:cNvPicPr>
+          <p:nvPr/>
+        </p:nvPicPr>
+        <p:blipFill rotWithShape="1">
+          <a:blip r:embed="rId3"/>
+          <a:srcRect r="20797"/>
+          <a:stretch/>
+        </p:blipFill>
+        <p:spPr>
+          <a:xfrm>
+            <a:off x="-19639" y="2562914"/>
+            <a:ext cx="4025343" cy="3248701"/>
+          </a:xfrm>
+          <a:prstGeom prst="rect">
+            <a:avLst/>
+          </a:prstGeom>
+        </p:spPr>
+      </p:pic>
+      <p:sp>
+        <p:nvSpPr>
+          <p:cNvPr id="6" name="CasellaDiTesto 5">
+            <a:extLst>
+              <a:ext uri="{FF2B5EF4-FFF2-40B4-BE49-F238E27FC236}">
+                <a16:creationId xmlns:a16="http://schemas.microsoft.com/office/drawing/2014/main" id="{11BC347C-3FB3-7999-ED3A-35E0C0DBCB2E}"/>
+              </a:ext>
+            </a:extLst>
+          </p:cNvPr>
+          <p:cNvSpPr txBox="1"/>
+          <p:nvPr/>
+        </p:nvSpPr>
+        <p:spPr>
+          <a:xfrm>
+            <a:off x="3379961" y="3273743"/>
+            <a:ext cx="2276521" cy="1200329"/>
+          </a:xfrm>
+          <a:prstGeom prst="rect">
+            <a:avLst/>
+          </a:prstGeom>
+          <a:noFill/>
+        </p:spPr>
+        <p:txBody>
+          <a:bodyPr wrap="none" rtlCol="0">
+            <a:spAutoFit/>
+          </a:bodyPr>
+          <a:lstStyle/>
+          <a:p>
+            <a:r>
+              <a:rPr lang="it-IT" dirty="0"/>
+              <a:t>Senza </a:t>
+            </a:r>
+            <a:r>
+              <a:rPr lang="it-IT" dirty="0" err="1"/>
+              <a:t>PUs</a:t>
+            </a:r>
+            <a:r>
+              <a:rPr lang="it-IT" dirty="0"/>
+              <a:t> «</a:t>
+            </a:r>
+            <a:r>
+              <a:rPr lang="it-IT" dirty="0" err="1"/>
+              <a:t>locked</a:t>
+            </a:r>
+            <a:r>
+              <a:rPr lang="it-IT" dirty="0"/>
+              <a:t>-in»</a:t>
+            </a:r>
+          </a:p>
+          <a:p>
+            <a:endParaRPr lang="it-IT" dirty="0"/>
+          </a:p>
+          <a:p>
+            <a:r>
+              <a:rPr lang="it-IT" dirty="0"/>
+              <a:t>370 </a:t>
+            </a:r>
+            <a:r>
+              <a:rPr lang="it-IT" dirty="0" err="1"/>
+              <a:t>PUs</a:t>
+            </a:r>
+            <a:r>
+              <a:rPr lang="it-IT" dirty="0"/>
+              <a:t> selezionate</a:t>
+            </a:r>
+          </a:p>
+          <a:p>
+            <a:r>
+              <a:rPr lang="it-IT" dirty="0"/>
+              <a:t>costo totale: 1399 M€</a:t>
+            </a:r>
+          </a:p>
+        </p:txBody>
+      </p:sp>
+      <p:sp>
+        <p:nvSpPr>
+          <p:cNvPr id="7" name="CasellaDiTesto 6">
+            <a:extLst>
+              <a:ext uri="{FF2B5EF4-FFF2-40B4-BE49-F238E27FC236}">
+                <a16:creationId xmlns:a16="http://schemas.microsoft.com/office/drawing/2014/main" id="{6131723C-9964-826C-9493-D3B7CB597750}"/>
+              </a:ext>
+            </a:extLst>
+          </p:cNvPr>
+          <p:cNvSpPr txBox="1"/>
+          <p:nvPr/>
+        </p:nvSpPr>
+        <p:spPr>
+          <a:xfrm>
+            <a:off x="9732728" y="3332591"/>
+            <a:ext cx="2239139" cy="1200329"/>
+          </a:xfrm>
+          <a:prstGeom prst="rect">
+            <a:avLst/>
+          </a:prstGeom>
+          <a:noFill/>
+        </p:spPr>
+        <p:txBody>
+          <a:bodyPr wrap="none" rtlCol="0">
+            <a:spAutoFit/>
+          </a:bodyPr>
+          <a:lstStyle/>
+          <a:p>
+            <a:r>
+              <a:rPr lang="it-IT" dirty="0"/>
+              <a:t>Con MPA esistenti</a:t>
+            </a:r>
+            <a:br>
+              <a:rPr lang="it-IT" dirty="0"/>
+            </a:br>
+            <a:r>
+              <a:rPr lang="it-IT" dirty="0"/>
+              <a:t>	«</a:t>
+            </a:r>
+            <a:r>
+              <a:rPr lang="it-IT" dirty="0" err="1"/>
+              <a:t>locked</a:t>
+            </a:r>
+            <a:r>
+              <a:rPr lang="it-IT" dirty="0"/>
+              <a:t>-in»</a:t>
+            </a:r>
+          </a:p>
+          <a:p>
+            <a:r>
+              <a:rPr lang="it-IT" dirty="0"/>
+              <a:t>474 </a:t>
+            </a:r>
+            <a:r>
+              <a:rPr lang="it-IT" dirty="0" err="1"/>
+              <a:t>PUs</a:t>
+            </a:r>
+            <a:r>
+              <a:rPr lang="it-IT" dirty="0"/>
+              <a:t> selezionate</a:t>
+            </a:r>
+          </a:p>
+          <a:p>
+            <a:r>
+              <a:rPr lang="it-IT" dirty="0"/>
+              <a:t>costo totale: 2271 M€</a:t>
+            </a:r>
+          </a:p>
+        </p:txBody>
+      </p:sp>
+    </p:spTree>
+    <p:extLst>
+      <p:ext uri="{BB962C8B-B14F-4D97-AF65-F5344CB8AC3E}">
+        <p14:creationId xmlns:p14="http://schemas.microsoft.com/office/powerpoint/2010/main" val="2737721882"/>
+      </p:ext>
+    </p:extLst>
+  </p:cSld>
+  <p:clrMapOvr>
+    <a:masterClrMapping/>
+  </p:clrMapOvr>
+</p:sld>
+</file>
+
+<file path=ppt/slides/slide19.xml><?xml version="1.0" encoding="utf-8"?>
+<p:sld xmlns:a="http://schemas.openxmlformats.org/drawingml/2006/main" xmlns:r="http://schemas.openxmlformats.org/officeDocument/2006/relationships" xmlns:p="http://schemas.openxmlformats.org/presentationml/2006/main">
+  <p:cSld>
+    <p:spTree>
+      <p:nvGrpSpPr>
+        <p:cNvPr id="1" name=""/>
+        <p:cNvGrpSpPr/>
+        <p:nvPr/>
+      </p:nvGrpSpPr>
+      <p:grpSpPr>
+        <a:xfrm>
+          <a:off x="0" y="0"/>
+          <a:ext cx="0" cy="0"/>
+          <a:chOff x="0" y="0"/>
+          <a:chExt cx="0" cy="0"/>
+        </a:xfrm>
+      </p:grpSpPr>
+      <p:sp>
+        <p:nvSpPr>
+          <p:cNvPr id="2" name="Titolo 1">
+            <a:extLst>
+              <a:ext uri="{FF2B5EF4-FFF2-40B4-BE49-F238E27FC236}">
+                <a16:creationId xmlns:a16="http://schemas.microsoft.com/office/drawing/2014/main" id="{77E1C6D2-6418-6335-D181-7FBC5925797D}"/>
+              </a:ext>
+            </a:extLst>
+          </p:cNvPr>
+          <p:cNvSpPr>
+            <a:spLocks noGrp="1"/>
+          </p:cNvSpPr>
+          <p:nvPr>
+            <p:ph type="title"/>
+          </p:nvPr>
+        </p:nvSpPr>
+        <p:spPr>
+          <a:xfrm>
+            <a:off x="838200" y="365126"/>
+            <a:ext cx="10515600" cy="842238"/>
+          </a:xfrm>
+        </p:spPr>
+        <p:txBody>
+          <a:bodyPr>
+            <a:normAutofit/>
+          </a:bodyPr>
+          <a:lstStyle/>
+          <a:p>
+            <a:r>
+              <a:rPr lang="it-IT" sz="4000" dirty="0"/>
+              <a:t>Zonazione</a:t>
+            </a:r>
+          </a:p>
+        </p:txBody>
+      </p:sp>
+      <p:sp>
+        <p:nvSpPr>
+          <p:cNvPr id="3" name="Segnaposto contenuto 2">
+            <a:extLst>
+              <a:ext uri="{FF2B5EF4-FFF2-40B4-BE49-F238E27FC236}">
+                <a16:creationId xmlns:a16="http://schemas.microsoft.com/office/drawing/2014/main" id="{66C7E2FE-3664-CDB5-6E46-D2F41D66DA38}"/>
+              </a:ext>
+            </a:extLst>
+          </p:cNvPr>
+          <p:cNvSpPr>
+            <a:spLocks noGrp="1"/>
+          </p:cNvSpPr>
+          <p:nvPr>
+            <p:ph idx="1"/>
+          </p:nvPr>
+        </p:nvSpPr>
+        <p:spPr>
+          <a:xfrm>
+            <a:off x="838200" y="1411550"/>
+            <a:ext cx="10515600" cy="4765413"/>
+          </a:xfrm>
+        </p:spPr>
+        <p:txBody>
+          <a:bodyPr/>
+          <a:lstStyle/>
+          <a:p>
+            <a:pPr marL="0" indent="0">
+              <a:buNone/>
+            </a:pPr>
+            <a:r>
+              <a:rPr lang="it-IT" dirty="0"/>
+              <a:t>Molti problemi di pianificazione riguardano più di una categoria di gestione e non solo la categorizzazione binaria area protetta / area non protetta.</a:t>
+            </a:r>
+          </a:p>
+          <a:p>
+            <a:pPr marL="0" indent="0">
+              <a:buNone/>
+            </a:pPr>
+            <a:r>
+              <a:rPr lang="it-IT" dirty="0"/>
+              <a:t>L'obiettivo è determinare quali aree dovrebbero essere assegnate a quale categoria di gestione.</a:t>
+            </a:r>
+          </a:p>
+          <a:p>
+            <a:pPr marL="0" indent="0">
+              <a:buNone/>
+            </a:pPr>
+            <a:r>
+              <a:rPr lang="it-IT" dirty="0"/>
+              <a:t>Esempio: area protetta no-take (Zona A), area parzialmente protetta (Zona B e Zona C), area non protetta</a:t>
+            </a:r>
+          </a:p>
+        </p:txBody>
+      </p:sp>
+    </p:spTree>
+    <p:extLst>
+      <p:ext uri="{BB962C8B-B14F-4D97-AF65-F5344CB8AC3E}">
+        <p14:creationId xmlns:p14="http://schemas.microsoft.com/office/powerpoint/2010/main" val="444543500"/>
       </p:ext>
     </p:extLst>
   </p:cSld>
@@ -3675,7 +6457,7 @@
         </p:spPr>
         <p:txBody>
           <a:bodyPr>
-            <a:normAutofit/>
+            <a:normAutofit lnSpcReduction="10000"/>
           </a:bodyPr>
           <a:lstStyle/>
           <a:p>
@@ -3686,6 +6468,25 @@
               <a:rPr lang="it-IT" dirty="0"/>
               <a:t>Approccio rigoroso e ripetibile per pianificare nuove aree protette che soddisfino efficacemente gli obiettivi di conservazione</a:t>
             </a:r>
+          </a:p>
+          <a:p>
+            <a:pPr marL="0" indent="0">
+              <a:buNone/>
+            </a:pPr>
+            <a:r>
+              <a:rPr lang="it-IT" dirty="0"/>
+              <a:t>Fondato sul principio di </a:t>
+            </a:r>
+            <a:r>
+              <a:rPr lang="it-IT" i="1" dirty="0"/>
+              <a:t>complementarietà</a:t>
+            </a:r>
+          </a:p>
+          <a:p>
+            <a:pPr marL="0" indent="0">
+              <a:buNone/>
+            </a:pPr>
+            <a:endParaRPr lang="it-IT" i="1" dirty="0"/>
           </a:p>
           <a:p>
             <a:pPr marL="514350" indent="-514350">
@@ -4116,7 +6917,15 @@
             </a:r>
             <a:r>
               <a:rPr lang="it-IT" sz="3200" dirty="0"/>
-              <a:t> o euristici (ex: Marxan):</a:t>
+              <a:t> o euristici (ex: </a:t>
+            </a:r>
+            <a:r>
+              <a:rPr lang="it-IT" sz="3200" cap="small" dirty="0"/>
+              <a:t>Marxan</a:t>
+            </a:r>
+            <a:r>
+              <a:rPr lang="it-IT" sz="3200" dirty="0"/>
+              <a:t>):</a:t>
             </a:r>
           </a:p>
           <a:p>
@@ -4143,8 +6952,12 @@
           </a:p>
           <a:p>
             <a:r>
+              <a:rPr lang="it-IT" sz="3200" cap="small" dirty="0"/>
+              <a:t>Prioritizr</a:t>
+            </a:r>
+            <a:r>
               <a:rPr lang="it-IT" sz="3200" dirty="0"/>
-              <a:t>Prioritizr (https://prioritizr.net/):</a:t>
+              <a:t> (https://prioritizr.net/):</a:t>
             </a:r>
           </a:p>
           <a:p>
@@ -4173,7 +6986,11 @@
             <a:pPr lvl="1"/>
             <a:r>
               <a:rPr lang="it-IT" sz="2800" dirty="0"/>
-              <a:t>Compatibile con dati input per Marxan</a:t>
+              <a:t>Compatibile con dati input per </a:t>
+            </a:r>
+            <a:r>
+              <a:rPr lang="it-IT" sz="2800" cap="small" dirty="0"/>
+              <a:t>Marxan</a:t>
             </a:r>
           </a:p>
         </p:txBody>
@@ -4213,7 +7030,7 @@
           <p:cNvPr id="2" name="Titolo 1">
             <a:extLst>
               <a:ext uri="{FF2B5EF4-FFF2-40B4-BE49-F238E27FC236}">
-                <a16:creationId xmlns:a16="http://schemas.microsoft.com/office/drawing/2014/main" id="{A94E7AC5-4920-3CFC-774E-FEE22569F3CD}"/>
+                <a16:creationId xmlns:a16="http://schemas.microsoft.com/office/drawing/2014/main" id="{08447835-2397-5A0A-DD75-19D695394AE5}"/>
               </a:ext>
             </a:extLst>
           </p:cNvPr>
@@ -4224,166 +7041,138 @@
             <p:ph type="title"/>
           </p:nvPr>
         </p:nvSpPr>
-        <p:spPr>
-          <a:xfrm>
-            <a:off x="838200" y="365125"/>
-            <a:ext cx="10515600" cy="620395"/>
+        <p:spPr/>
+        <p:txBody>
+          <a:bodyPr/>
+          <a:lstStyle/>
+          <a:p>
+            <a:r>
+              <a:rPr lang="it-IT" dirty="0"/>
+              <a:t>Esempio: applicazione di </a:t>
+            </a:r>
+            <a:r>
+              <a:rPr lang="it-IT" cap="small" dirty="0" err="1"/>
+              <a:t>prioritzr</a:t>
+            </a:r>
+            <a:r>
+              <a:rPr lang="it-IT" dirty="0"/>
+              <a:t> all’area pilota </a:t>
+            </a:r>
+            <a:r>
+              <a:rPr lang="it-IT" dirty="0" err="1"/>
+              <a:t>Strait</a:t>
+            </a:r>
+            <a:r>
+              <a:rPr lang="it-IT" dirty="0"/>
+              <a:t> of </a:t>
+            </a:r>
+            <a:r>
+              <a:rPr lang="it-IT" dirty="0" err="1"/>
+              <a:t>Sicily</a:t>
+            </a:r>
+            <a:r>
+              <a:rPr lang="it-IT" dirty="0"/>
+              <a:t> (</a:t>
+            </a:r>
+            <a:r>
+              <a:rPr lang="it-IT" dirty="0" err="1"/>
+              <a:t>SoS</a:t>
+            </a:r>
+            <a:r>
+              <a:rPr lang="it-IT" dirty="0"/>
+              <a:t>)</a:t>
+            </a:r>
+          </a:p>
+        </p:txBody>
+      </p:sp>
+      <p:sp>
+        <p:nvSpPr>
+          <p:cNvPr id="3" name="Segnaposto contenuto 2">
+            <a:extLst>
+              <a:ext uri="{FF2B5EF4-FFF2-40B4-BE49-F238E27FC236}">
+                <a16:creationId xmlns:a16="http://schemas.microsoft.com/office/drawing/2014/main" id="{8A15D1A8-12A4-C4CC-D310-5FC82050F380}"/>
+              </a:ext>
+            </a:extLst>
+          </p:cNvPr>
+          <p:cNvSpPr>
+            <a:spLocks noGrp="1"/>
+          </p:cNvSpPr>
+          <p:nvPr>
+            <p:ph idx="1"/>
+          </p:nvPr>
+        </p:nvSpPr>
+        <p:spPr>
+          <a:xfrm>
+            <a:off x="838200" y="2077375"/>
+            <a:ext cx="5477759" cy="4099588"/>
           </a:xfrm>
         </p:spPr>
         <p:txBody>
           <a:bodyPr>
-            <a:normAutofit fontScale="90000"/>
+            <a:noAutofit/>
           </a:bodyPr>
           <a:lstStyle/>
           <a:p>
             <a:r>
-              <a:rPr lang="it-IT" dirty="0" err="1"/>
-              <a:t>Systematic</a:t>
-            </a:r>
-            <a:r>
-              <a:rPr lang="it-IT" dirty="0"/>
-              <a:t> </a:t>
-            </a:r>
-            <a:r>
-              <a:rPr lang="it-IT" dirty="0" err="1"/>
-              <a:t>conservation</a:t>
-            </a:r>
-            <a:r>
-              <a:rPr lang="it-IT" dirty="0"/>
-              <a:t> planning</a:t>
-            </a:r>
-          </a:p>
-        </p:txBody>
-      </p:sp>
-      <p:sp>
-        <p:nvSpPr>
-          <p:cNvPr id="3" name="Segnaposto contenuto 2">
-            <a:extLst>
-              <a:ext uri="{FF2B5EF4-FFF2-40B4-BE49-F238E27FC236}">
-                <a16:creationId xmlns:a16="http://schemas.microsoft.com/office/drawing/2014/main" id="{9824F629-0E76-DD4A-9A0C-05274DC99AE3}"/>
-              </a:ext>
-            </a:extLst>
-          </p:cNvPr>
-          <p:cNvSpPr>
-            <a:spLocks noGrp="1"/>
-          </p:cNvSpPr>
-          <p:nvPr>
-            <p:ph idx="1"/>
-          </p:nvPr>
-        </p:nvSpPr>
-        <p:spPr>
-          <a:xfrm>
-            <a:off x="838200" y="1178560"/>
-            <a:ext cx="10515600" cy="4998403"/>
-          </a:xfrm>
-        </p:spPr>
-        <p:txBody>
-          <a:bodyPr>
-            <a:normAutofit lnSpcReduction="10000"/>
-          </a:bodyPr>
-          <a:lstStyle/>
-          <a:p>
-            <a:r>
-              <a:rPr lang="it-IT" dirty="0"/>
-              <a:t>Pianificazione spaziale per la conservazione come problema matematico di ottimizzazione in funzione di:</a:t>
-            </a:r>
-          </a:p>
-          <a:p>
-            <a:pPr lvl="1"/>
-            <a:r>
-              <a:rPr lang="it-IT" dirty="0"/>
-              <a:t>Unità di pianificazione (planning </a:t>
-            </a:r>
-            <a:r>
-              <a:rPr lang="it-IT" dirty="0" err="1"/>
+              <a:rPr lang="it-IT" sz="2400" dirty="0"/>
+              <a:t>Suddivisione in </a:t>
+            </a:r>
+            <a:r>
+              <a:rPr lang="it-IT" sz="2400" i="1" dirty="0"/>
+              <a:t>planning </a:t>
+            </a:r>
+            <a:r>
+              <a:rPr lang="it-IT" sz="2400" i="1" dirty="0" err="1"/>
               <a:t>units</a:t>
             </a:r>
             <a:r>
-              <a:rPr lang="it-IT" dirty="0"/>
-              <a:t>)</a:t>
-            </a:r>
-          </a:p>
-          <a:p>
-            <a:pPr lvl="1"/>
-            <a:r>
-              <a:rPr lang="it-IT" dirty="0"/>
-              <a:t>Elementi della biodiversità (</a:t>
-            </a:r>
-            <a:r>
-              <a:rPr lang="it-IT" dirty="0" err="1"/>
-              <a:t>conservation</a:t>
-            </a:r>
-            <a:r>
-              <a:rPr lang="it-IT" dirty="0"/>
-              <a:t> features)</a:t>
-            </a:r>
-          </a:p>
-          <a:p>
-            <a:pPr lvl="1"/>
-            <a:r>
-              <a:rPr lang="it-IT" dirty="0"/>
-              <a:t>Costi di conservazione (per ogni planning </a:t>
-            </a:r>
-            <a:r>
-              <a:rPr lang="it-IT" dirty="0" err="1"/>
-              <a:t>unit</a:t>
-            </a:r>
-            <a:r>
-              <a:rPr lang="it-IT" dirty="0"/>
-              <a:t>)</a:t>
-            </a:r>
-          </a:p>
-          <a:p>
-            <a:endParaRPr lang="it-IT" dirty="0"/>
-          </a:p>
-          <a:p>
-            <a:r>
-              <a:rPr lang="it-IT" dirty="0"/>
-              <a:t>Due formulazioni:</a:t>
-            </a:r>
-          </a:p>
-          <a:p>
-            <a:pPr lvl="1"/>
-            <a:r>
-              <a:rPr lang="it-IT" dirty="0"/>
-              <a:t>«Minimum set»: raggiungere tutti gli obiettivi (</a:t>
-            </a:r>
-            <a:r>
-              <a:rPr lang="it-IT" i="1" dirty="0"/>
-              <a:t>target</a:t>
-            </a:r>
-            <a:r>
-              <a:rPr lang="it-IT" dirty="0"/>
-              <a:t>) di conservazione al minor costo</a:t>
-            </a:r>
-          </a:p>
-          <a:p>
-            <a:pPr lvl="1"/>
-            <a:r>
-              <a:rPr lang="it-IT" dirty="0"/>
-              <a:t>«Maximum coverage»: raggiungere il maggior numero di obiettivi di conservazione a un dato costo (</a:t>
-            </a:r>
-            <a:r>
-              <a:rPr lang="it-IT" i="1" dirty="0"/>
-              <a:t>budget</a:t>
-            </a:r>
-            <a:r>
-              <a:rPr lang="it-IT" dirty="0"/>
-              <a:t>)</a:t>
-            </a:r>
-          </a:p>
-          <a:p>
-            <a:r>
-              <a:rPr lang="it-IT" dirty="0"/>
-              <a:t>Definizione del problema</a:t>
-            </a:r>
-          </a:p>
-        </p:txBody>
-      </p:sp>
+              <a:rPr lang="it-IT" sz="2400" dirty="0"/>
+              <a:t> quadrate (ma possibili </a:t>
+            </a:r>
+            <a:r>
+              <a:rPr lang="it-IT" sz="2400" dirty="0" err="1"/>
+              <a:t>PUs</a:t>
+            </a:r>
+            <a:r>
+              <a:rPr lang="it-IT" sz="2400" dirty="0"/>
+              <a:t> di qualsiasi forma e area)</a:t>
+            </a:r>
+          </a:p>
+        </p:txBody>
+      </p:sp>
+      <p:pic>
+        <p:nvPicPr>
+          <p:cNvPr id="8" name="Immagine 7">
+            <a:extLst>
+              <a:ext uri="{FF2B5EF4-FFF2-40B4-BE49-F238E27FC236}">
+                <a16:creationId xmlns:a16="http://schemas.microsoft.com/office/drawing/2014/main" id="{E5100C15-5A43-CA85-26E8-870006576012}"/>
+              </a:ext>
+            </a:extLst>
+          </p:cNvPr>
+          <p:cNvPicPr>
+            <a:picLocks noChangeAspect="1"/>
+          </p:cNvPicPr>
+          <p:nvPr/>
+        </p:nvPicPr>
+        <p:blipFill rotWithShape="1">
+          <a:blip r:embed="rId2"/>
+          <a:srcRect l="11121"/>
+          <a:stretch/>
+        </p:blipFill>
+        <p:spPr>
+          <a:xfrm>
+            <a:off x="6450285" y="2105656"/>
+            <a:ext cx="5477759" cy="3940932"/>
+          </a:xfrm>
+          <a:prstGeom prst="rect">
+            <a:avLst/>
+          </a:prstGeom>
+        </p:spPr>
+      </p:pic>
     </p:spTree>
     <p:extLst>
       <p:ext uri="{BB962C8B-B14F-4D97-AF65-F5344CB8AC3E}">
-        <p14:creationId xmlns:p14="http://schemas.microsoft.com/office/powerpoint/2010/main" val="2738443075"/>
+        <p14:creationId xmlns:p14="http://schemas.microsoft.com/office/powerpoint/2010/main" val="2263053092"/>
       </p:ext>
     </p:extLst>
   </p:cSld>
@@ -4415,7 +7204,7 @@
           <p:cNvPr id="2" name="Titolo 1">
             <a:extLst>
               <a:ext uri="{FF2B5EF4-FFF2-40B4-BE49-F238E27FC236}">
-                <a16:creationId xmlns:a16="http://schemas.microsoft.com/office/drawing/2014/main" id="{8C550A40-1E8B-E231-2BAF-0CB95A8634C1}"/>
+                <a16:creationId xmlns:a16="http://schemas.microsoft.com/office/drawing/2014/main" id="{08447835-2397-5A0A-DD75-19D695394AE5}"/>
               </a:ext>
             </a:extLst>
           </p:cNvPr>
@@ -4433,7 +7222,39 @@
           <a:p>
             <a:r>
               <a:rPr lang="it-IT" dirty="0"/>
-              <a:t>Prioritizr</a:t>
+              <a:t>Esempio: applicazione di </a:t>
+            </a:r>
+            <a:r>
+              <a:rPr lang="it-IT" cap="small" dirty="0" err="1"/>
+              <a:t>prioritzr</a:t>
+            </a:r>
+            <a:r>
+              <a:rPr lang="it-IT" dirty="0"/>
+              <a:t> all’area pilota </a:t>
+            </a:r>
+            <a:r>
+              <a:rPr lang="it-IT" dirty="0" err="1"/>
+              <a:t>Strait</a:t>
+            </a:r>
+            <a:r>
+              <a:rPr lang="it-IT" dirty="0"/>
+              <a:t> of </a:t>
+            </a:r>
+            <a:r>
+              <a:rPr lang="it-IT" dirty="0" err="1"/>
+              <a:t>Sicily</a:t>
+            </a:r>
+            <a:r>
+              <a:rPr lang="it-IT" dirty="0"/>
+              <a:t> (</a:t>
+            </a:r>
+            <a:r>
+              <a:rPr lang="it-IT" dirty="0" err="1"/>
+              <a:t>SoS</a:t>
+            </a:r>
+            <a:r>
+              <a:rPr lang="it-IT" dirty="0"/>
+              <a:t>)</a:t>
             </a:r>
           </a:p>
         </p:txBody>
@@ -4443,7 +7264,7 @@
           <p:cNvPr id="3" name="Segnaposto contenuto 2">
             <a:extLst>
               <a:ext uri="{FF2B5EF4-FFF2-40B4-BE49-F238E27FC236}">
-                <a16:creationId xmlns:a16="http://schemas.microsoft.com/office/drawing/2014/main" id="{3FFB11EC-55D9-C063-570F-3E614E331F62}"/>
+                <a16:creationId xmlns:a16="http://schemas.microsoft.com/office/drawing/2014/main" id="{8A15D1A8-12A4-C4CC-D310-5FC82050F380}"/>
               </a:ext>
             </a:extLst>
           </p:cNvPr>
@@ -4456,170 +7277,161 @@
         </p:nvSpPr>
         <p:spPr>
           <a:xfrm>
-            <a:off x="838200" y="1447060"/>
-            <a:ext cx="10515600" cy="4729903"/>
-          </a:xfrm>
-        </p:spPr>
-        <p:txBody>
-          <a:bodyPr/>
-          <a:lstStyle/>
-          <a:p>
-            <a:r>
-              <a:rPr lang="it-IT" dirty="0"/>
-              <a:t>Small-scale: pilot </a:t>
+            <a:off x="838200" y="2077375"/>
+            <a:ext cx="5477759" cy="4099588"/>
+          </a:xfrm>
+        </p:spPr>
+        <p:txBody>
+          <a:bodyPr>
+            <a:noAutofit/>
+          </a:bodyPr>
+          <a:lstStyle/>
+          <a:p>
+            <a:r>
+              <a:rPr lang="it-IT" sz="2400" dirty="0"/>
+              <a:t>Suddivisione in </a:t>
+            </a:r>
+            <a:r>
+              <a:rPr lang="it-IT" sz="2400" i="1" dirty="0"/>
+              <a:t>planning </a:t>
+            </a:r>
+            <a:r>
+              <a:rPr lang="it-IT" sz="2400" i="1" dirty="0" err="1"/>
+              <a:t>units</a:t>
+            </a:r>
+            <a:r>
+              <a:rPr lang="it-IT" sz="2400" dirty="0"/>
+              <a:t> quadrate (ma possibili </a:t>
+            </a:r>
+            <a:r>
+              <a:rPr lang="it-IT" sz="2400" dirty="0" err="1"/>
+              <a:t>PUs</a:t>
+            </a:r>
+            <a:r>
+              <a:rPr lang="it-IT" sz="2400" dirty="0"/>
+              <a:t> di qualsiasi forma e area)</a:t>
+            </a:r>
+          </a:p>
+        </p:txBody>
+      </p:sp>
+      <p:pic>
+        <p:nvPicPr>
+          <p:cNvPr id="4" name="Immagine 3">
+            <a:extLst>
+              <a:ext uri="{FF2B5EF4-FFF2-40B4-BE49-F238E27FC236}">
+                <a16:creationId xmlns:a16="http://schemas.microsoft.com/office/drawing/2014/main" id="{3357A2C0-74CD-8A26-50DF-C4131A3DD6B8}"/>
+              </a:ext>
+            </a:extLst>
+          </p:cNvPr>
+          <p:cNvPicPr>
+            <a:picLocks noChangeAspect="1"/>
+          </p:cNvPicPr>
+          <p:nvPr/>
+        </p:nvPicPr>
+        <p:blipFill rotWithShape="1">
+          <a:blip r:embed="rId2"/>
+          <a:srcRect l="11121"/>
+          <a:stretch/>
+        </p:blipFill>
+        <p:spPr>
+          <a:xfrm>
+            <a:off x="6450285" y="2105656"/>
+            <a:ext cx="5477759" cy="3940932"/>
+          </a:xfrm>
+          <a:prstGeom prst="rect">
+            <a:avLst/>
+          </a:prstGeom>
+        </p:spPr>
+      </p:pic>
+      <p:pic>
+        <p:nvPicPr>
+          <p:cNvPr id="6" name="Immagine 5">
+            <a:extLst>
+              <a:ext uri="{FF2B5EF4-FFF2-40B4-BE49-F238E27FC236}">
+                <a16:creationId xmlns:a16="http://schemas.microsoft.com/office/drawing/2014/main" id="{F2D339FF-DB97-7D4B-4482-FE27F1A11894}"/>
+              </a:ext>
+            </a:extLst>
+          </p:cNvPr>
+          <p:cNvPicPr>
+            <a:picLocks noChangeAspect="1"/>
+          </p:cNvPicPr>
+          <p:nvPr/>
+        </p:nvPicPr>
+        <p:blipFill>
+          <a:blip r:embed="rId3"/>
+          <a:stretch>
+            <a:fillRect/>
+          </a:stretch>
+        </p:blipFill>
+        <p:spPr>
+          <a:xfrm>
+            <a:off x="838200" y="4194928"/>
+            <a:ext cx="2745059" cy="2297947"/>
+          </a:xfrm>
+          <a:prstGeom prst="rect">
+            <a:avLst/>
+          </a:prstGeom>
+        </p:spPr>
+      </p:pic>
+      <p:sp>
+        <p:nvSpPr>
+          <p:cNvPr id="7" name="CasellaDiTesto 6">
+            <a:extLst>
+              <a:ext uri="{FF2B5EF4-FFF2-40B4-BE49-F238E27FC236}">
+                <a16:creationId xmlns:a16="http://schemas.microsoft.com/office/drawing/2014/main" id="{2AE3975B-8745-013A-BE80-6213BC4EAF77}"/>
+              </a:ext>
+            </a:extLst>
+          </p:cNvPr>
+          <p:cNvSpPr txBox="1"/>
+          <p:nvPr/>
+        </p:nvSpPr>
+        <p:spPr>
+          <a:xfrm>
+            <a:off x="838200" y="3548597"/>
+            <a:ext cx="3001527" cy="646331"/>
+          </a:xfrm>
+          <a:prstGeom prst="rect">
+            <a:avLst/>
+          </a:prstGeom>
+          <a:noFill/>
+        </p:spPr>
+        <p:txBody>
+          <a:bodyPr wrap="none" rtlCol="0">
+            <a:spAutoFit/>
+          </a:bodyPr>
+          <a:lstStyle/>
+          <a:p>
+            <a:r>
+              <a:rPr lang="it-IT" dirty="0"/>
+              <a:t>geoplatform.tools4MSP.eu</a:t>
+            </a:r>
+            <a:br>
+              <a:rPr lang="it-IT" dirty="0"/>
+            </a:br>
+            <a:r>
+              <a:rPr lang="it-IT" dirty="0"/>
+              <a:t>planning </a:t>
             </a:r>
             <a:r>
               <a:rPr lang="it-IT" dirty="0" err="1"/>
-              <a:t>areas</a:t>
-            </a:r>
-            <a:endParaRPr lang="it-IT" dirty="0"/>
-          </a:p>
-          <a:p>
-            <a:r>
-              <a:rPr lang="it-IT" dirty="0"/>
-              <a:t>National scale: </a:t>
+              <a:t>units</a:t>
+            </a:r>
+            <a:r>
+              <a:rPr lang="it-IT" dirty="0"/>
+              <a:t> – </a:t>
             </a:r>
             <a:r>
               <a:rPr lang="it-IT" dirty="0" err="1"/>
-              <a:t>entire</a:t>
-            </a:r>
-            <a:r>
-              <a:rPr lang="it-IT" dirty="0"/>
-              <a:t> </a:t>
+              <a:t>all</a:t>
+            </a:r>
+            <a:r>
+              <a:rPr lang="it-IT" dirty="0"/>
+              <a:t> MSP - </a:t>
             </a:r>
             <a:r>
               <a:rPr lang="it-IT" dirty="0" err="1"/>
-              <a:t>Italian</a:t>
-            </a:r>
-            <a:r>
-              <a:rPr lang="it-IT" dirty="0"/>
-              <a:t> </a:t>
-            </a:r>
-            <a:r>
-              <a:rPr lang="it-IT" dirty="0" err="1"/>
-              <a:t>waters</a:t>
-            </a:r>
-            <a:endParaRPr lang="it-IT" dirty="0"/>
-          </a:p>
-          <a:p>
-            <a:r>
-              <a:rPr lang="it-IT" dirty="0"/>
-              <a:t>Basin scale: </a:t>
-            </a:r>
-            <a:r>
-              <a:rPr lang="it-IT" dirty="0" err="1"/>
-              <a:t>entire</a:t>
-            </a:r>
-            <a:r>
-              <a:rPr lang="it-IT" dirty="0"/>
-              <a:t> </a:t>
-            </a:r>
-            <a:r>
-              <a:rPr lang="it-IT" dirty="0" err="1"/>
-              <a:t>Mediterranean</a:t>
-            </a:r>
-            <a:r>
-              <a:rPr lang="it-IT" dirty="0"/>
-              <a:t> Sea</a:t>
-            </a:r>
-          </a:p>
-          <a:p>
-            <a:endParaRPr lang="it-IT" dirty="0"/>
-          </a:p>
-          <a:p>
-            <a:r>
-              <a:rPr lang="it-IT" dirty="0"/>
-              <a:t>Input: 635 </a:t>
-            </a:r>
-            <a:r>
-              <a:rPr lang="it-IT" dirty="0" err="1"/>
-              <a:t>species</a:t>
-            </a:r>
-            <a:r>
-              <a:rPr lang="it-IT" dirty="0"/>
-              <a:t> of </a:t>
-            </a:r>
-            <a:r>
-              <a:rPr lang="it-IT" dirty="0" err="1"/>
-              <a:t>bony</a:t>
-            </a:r>
-            <a:r>
-              <a:rPr lang="it-IT" dirty="0"/>
-              <a:t> </a:t>
-            </a:r>
-            <a:r>
-              <a:rPr lang="it-IT" dirty="0" err="1"/>
-              <a:t>fishes</a:t>
-            </a:r>
-            <a:br>
-              <a:rPr lang="it-IT" dirty="0"/>
-            </a:br>
-            <a:r>
-              <a:rPr lang="it-IT" dirty="0" err="1"/>
-              <a:t>layers</a:t>
-            </a:r>
-            <a:r>
-              <a:rPr lang="it-IT" dirty="0"/>
-              <a:t> from Albouy et al 2015 (</a:t>
-            </a:r>
-            <a:r>
-              <a:rPr lang="it-IT" dirty="0" err="1"/>
-              <a:t>atlas</a:t>
-            </a:r>
-            <a:r>
-              <a:rPr lang="it-IT" dirty="0"/>
-              <a:t> 1980 of the </a:t>
-            </a:r>
-            <a:r>
-              <a:rPr lang="it-IT" dirty="0" err="1"/>
-              <a:t>Mediterranean</a:t>
-            </a:r>
-            <a:r>
-              <a:rPr lang="it-IT" dirty="0"/>
-              <a:t> Sea)</a:t>
-            </a:r>
-          </a:p>
-          <a:p>
-            <a:endParaRPr lang="it-IT" dirty="0"/>
-          </a:p>
-          <a:p>
-            <a:r>
-              <a:rPr lang="it-IT" dirty="0" err="1">
-                <a:solidFill>
-                  <a:srgbClr val="FF0000"/>
-                </a:solidFill>
-              </a:rPr>
-              <a:t>map</a:t>
-            </a:r>
-            <a:r>
-              <a:rPr lang="it-IT" dirty="0">
-                <a:solidFill>
-                  <a:srgbClr val="FF0000"/>
-                </a:solidFill>
-              </a:rPr>
-              <a:t> of </a:t>
-            </a:r>
-            <a:r>
-              <a:rPr lang="it-IT" dirty="0" err="1">
-                <a:solidFill>
-                  <a:srgbClr val="FF0000"/>
-                </a:solidFill>
-              </a:rPr>
-              <a:t>richness</a:t>
-            </a:r>
-            <a:r>
-              <a:rPr lang="it-IT" dirty="0">
-                <a:solidFill>
-                  <a:srgbClr val="FF0000"/>
-                </a:solidFill>
-              </a:rPr>
-              <a:t>?</a:t>
-            </a:r>
-          </a:p>
-          <a:p>
-            <a:pPr marL="0" indent="0">
-              <a:buNone/>
-            </a:pPr>
+              <a:t>Italy</a:t>
+            </a:r>
             <a:endParaRPr lang="it-IT" dirty="0"/>
           </a:p>
         </p:txBody>
@@ -4627,7 +7439,7 @@
     </p:spTree>
     <p:extLst>
       <p:ext uri="{BB962C8B-B14F-4D97-AF65-F5344CB8AC3E}">
-        <p14:creationId xmlns:p14="http://schemas.microsoft.com/office/powerpoint/2010/main" val="3502901950"/>
+        <p14:creationId xmlns:p14="http://schemas.microsoft.com/office/powerpoint/2010/main" val="1824632976"/>
       </p:ext>
     </p:extLst>
   </p:cSld>
@@ -4659,7 +7471,7 @@
           <p:cNvPr id="2" name="Titolo 1">
             <a:extLst>
               <a:ext uri="{FF2B5EF4-FFF2-40B4-BE49-F238E27FC236}">
-                <a16:creationId xmlns:a16="http://schemas.microsoft.com/office/drawing/2014/main" id="{DB3493D8-21E5-0FD1-A0AE-A90F35D1D7A7}"/>
+                <a16:creationId xmlns:a16="http://schemas.microsoft.com/office/drawing/2014/main" id="{08447835-2397-5A0A-DD75-19D695394AE5}"/>
               </a:ext>
             </a:extLst>
           </p:cNvPr>
@@ -4670,27 +7482,47 @@
             <p:ph type="title"/>
           </p:nvPr>
         </p:nvSpPr>
-        <p:spPr>
-          <a:xfrm>
-            <a:off x="838200" y="365126"/>
-            <a:ext cx="10515600" cy="682440"/>
-          </a:xfrm>
-        </p:spPr>
-        <p:txBody>
-          <a:bodyPr>
-            <a:normAutofit fontScale="90000"/>
-          </a:bodyPr>
-          <a:lstStyle/>
-          <a:p>
-            <a:r>
-              <a:rPr lang="it-IT" dirty="0"/>
-              <a:t>Pilot area: </a:t>
+        <p:spPr/>
+        <p:txBody>
+          <a:bodyPr/>
+          <a:lstStyle/>
+          <a:p>
+            <a:r>
+              <a:rPr lang="it-IT" dirty="0"/>
+              <a:t>Esempio: applicazione di </a:t>
+            </a:r>
+            <a:r>
+              <a:rPr lang="it-IT" cap="small" dirty="0" err="1"/>
+              <a:t>prioritzr</a:t>
+            </a:r>
+            <a:r>
+              <a:rPr lang="it-IT" dirty="0"/>
+              <a:t> all’area pilota </a:t>
+            </a:r>
+            <a:r>
+              <a:rPr lang="it-IT" dirty="0" err="1"/>
+              <a:t>Strait</a:t>
+            </a:r>
+            <a:r>
+              <a:rPr lang="it-IT" dirty="0"/>
+              <a:t> of </a:t>
+            </a:r>
+            <a:r>
+              <a:rPr lang="it-IT" dirty="0" err="1"/>
+              <a:t>Sicily</a:t>
+            </a:r>
+            <a:r>
+              <a:rPr lang="it-IT" dirty="0"/>
+              <a:t> (</a:t>
             </a:r>
             <a:r>
               <a:rPr lang="it-IT" dirty="0" err="1"/>
               <a:t>SoS</a:t>
             </a:r>
-            <a:endParaRPr lang="it-IT" dirty="0"/>
+            <a:r>
+              <a:rPr lang="it-IT" dirty="0"/>
+              <a:t>)</a:t>
+            </a:r>
           </a:p>
         </p:txBody>
       </p:sp>
@@ -4699,7 +7531,7 @@
           <p:cNvPr id="3" name="Segnaposto contenuto 2">
             <a:extLst>
               <a:ext uri="{FF2B5EF4-FFF2-40B4-BE49-F238E27FC236}">
-                <a16:creationId xmlns:a16="http://schemas.microsoft.com/office/drawing/2014/main" id="{2FBDC91D-6C05-0930-712D-61825C5859A4}"/>
+                <a16:creationId xmlns:a16="http://schemas.microsoft.com/office/drawing/2014/main" id="{8A15D1A8-12A4-C4CC-D310-5FC82050F380}"/>
               </a:ext>
             </a:extLst>
           </p:cNvPr>
@@ -4712,113 +7544,98 @@
         </p:nvSpPr>
         <p:spPr>
           <a:xfrm>
-            <a:off x="838200" y="1225118"/>
-            <a:ext cx="10515600" cy="4951845"/>
-          </a:xfrm>
-        </p:spPr>
-        <p:txBody>
-          <a:bodyPr/>
-          <a:lstStyle/>
-          <a:p>
-            <a:r>
-              <a:rPr lang="it-IT" dirty="0"/>
-              <a:t>No cost vs with cost</a:t>
-            </a:r>
-          </a:p>
-          <a:p>
-            <a:r>
-              <a:rPr lang="it-IT" dirty="0"/>
-              <a:t>No cost, no </a:t>
-            </a:r>
-            <a:r>
-              <a:rPr lang="it-IT" dirty="0" err="1"/>
-              <a:t>fragmentation</a:t>
-            </a:r>
-            <a:endParaRPr lang="it-IT" dirty="0"/>
-          </a:p>
-          <a:p>
-            <a:r>
-              <a:rPr lang="it-IT" dirty="0"/>
-              <a:t>No cost, </a:t>
-            </a:r>
-            <a:r>
-              <a:rPr lang="it-IT" dirty="0" err="1"/>
-              <a:t>connectivity</a:t>
-            </a:r>
-            <a:endParaRPr lang="it-IT" dirty="0"/>
-          </a:p>
-          <a:p>
-            <a:r>
-              <a:rPr lang="it-IT" dirty="0" err="1"/>
-              <a:t>different</a:t>
-            </a:r>
-            <a:r>
-              <a:rPr lang="it-IT" dirty="0"/>
-              <a:t> </a:t>
-            </a:r>
-            <a:r>
-              <a:rPr lang="it-IT" dirty="0" err="1"/>
-              <a:t>representation</a:t>
-            </a:r>
-            <a:r>
-              <a:rPr lang="it-IT" dirty="0"/>
-              <a:t> targets</a:t>
-            </a:r>
-          </a:p>
-          <a:p>
-            <a:r>
-              <a:rPr lang="it-IT" dirty="0"/>
-              <a:t>minimum set vs </a:t>
-            </a:r>
-            <a:r>
-              <a:rPr lang="it-IT" dirty="0" err="1"/>
-              <a:t>maximal</a:t>
-            </a:r>
-            <a:r>
-              <a:rPr lang="it-IT" dirty="0"/>
-              <a:t> coverage</a:t>
-            </a:r>
-          </a:p>
-          <a:p>
-            <a:r>
-              <a:rPr lang="it-IT" dirty="0" err="1"/>
-              <a:t>starting</a:t>
-            </a:r>
-            <a:r>
-              <a:rPr lang="it-IT" dirty="0"/>
-              <a:t> from </a:t>
-            </a:r>
-            <a:r>
-              <a:rPr lang="it-IT" dirty="0" err="1"/>
-              <a:t>existing</a:t>
-            </a:r>
-            <a:r>
-              <a:rPr lang="it-IT" dirty="0"/>
-              <a:t> plan: </a:t>
-            </a:r>
-            <a:r>
-              <a:rPr lang="it-IT" dirty="0" err="1"/>
-              <a:t>locked</a:t>
-            </a:r>
-            <a:r>
-              <a:rPr lang="it-IT" dirty="0"/>
-              <a:t>-in / </a:t>
-            </a:r>
-            <a:r>
-              <a:rPr lang="it-IT" dirty="0" err="1"/>
-              <a:t>locked</a:t>
-            </a:r>
-            <a:r>
-              <a:rPr lang="it-IT" dirty="0"/>
-              <a:t>-out</a:t>
-            </a:r>
-          </a:p>
-        </p:txBody>
-      </p:sp>
+            <a:off x="838200" y="2077375"/>
+            <a:ext cx="5477759" cy="4099588"/>
+          </a:xfrm>
+        </p:spPr>
+        <p:txBody>
+          <a:bodyPr>
+            <a:noAutofit/>
+          </a:bodyPr>
+          <a:lstStyle/>
+          <a:p>
+            <a:r>
+              <a:rPr lang="it-IT" sz="2400" dirty="0"/>
+              <a:t>Suddivisione in </a:t>
+            </a:r>
+            <a:r>
+              <a:rPr lang="it-IT" sz="2400" i="1" dirty="0"/>
+              <a:t>planning </a:t>
+            </a:r>
+            <a:r>
+              <a:rPr lang="it-IT" sz="2400" i="1" dirty="0" err="1"/>
+              <a:t>units</a:t>
+            </a:r>
+            <a:r>
+              <a:rPr lang="it-IT" sz="2400" dirty="0"/>
+              <a:t> quadrate (ma possibili </a:t>
+            </a:r>
+            <a:r>
+              <a:rPr lang="it-IT" sz="2400" dirty="0" err="1"/>
+              <a:t>PUs</a:t>
+            </a:r>
+            <a:r>
+              <a:rPr lang="it-IT" sz="2400" dirty="0"/>
+              <a:t> di qualsiasi forma e area)</a:t>
+            </a:r>
+          </a:p>
+          <a:p>
+            <a:r>
+              <a:rPr lang="it-IT" sz="2400" dirty="0"/>
+              <a:t>Costi di conservazione: costo-opportunità per attività di pesca (commerciale e non) e acquacoltura (</a:t>
+            </a:r>
+            <a:r>
+              <a:rPr lang="it-IT" sz="2400" dirty="0" err="1"/>
+              <a:t>Mazor</a:t>
+            </a:r>
+            <a:r>
+              <a:rPr lang="it-IT" sz="2400" dirty="0"/>
+              <a:t>, Giakoumi </a:t>
+            </a:r>
+            <a:r>
+              <a:rPr lang="it-IT" sz="2400" i="1" dirty="0"/>
+              <a:t>et al.</a:t>
+            </a:r>
+            <a:r>
+              <a:rPr lang="it-IT" sz="2400" dirty="0"/>
+              <a:t> 2014)</a:t>
+            </a:r>
+          </a:p>
+        </p:txBody>
+      </p:sp>
+      <p:pic>
+        <p:nvPicPr>
+          <p:cNvPr id="4" name="Immagine 3">
+            <a:extLst>
+              <a:ext uri="{FF2B5EF4-FFF2-40B4-BE49-F238E27FC236}">
+                <a16:creationId xmlns:a16="http://schemas.microsoft.com/office/drawing/2014/main" id="{8972AA14-F825-DE41-61E8-59AB517F4192}"/>
+              </a:ext>
+            </a:extLst>
+          </p:cNvPr>
+          <p:cNvPicPr>
+            <a:picLocks noChangeAspect="1"/>
+          </p:cNvPicPr>
+          <p:nvPr/>
+        </p:nvPicPr>
+        <p:blipFill rotWithShape="1">
+          <a:blip r:embed="rId2"/>
+          <a:srcRect r="14195"/>
+          <a:stretch/>
+        </p:blipFill>
+        <p:spPr>
+          <a:xfrm>
+            <a:off x="6315959" y="1907692"/>
+            <a:ext cx="5854173" cy="4361133"/>
+          </a:xfrm>
+          <a:prstGeom prst="rect">
+            <a:avLst/>
+          </a:prstGeom>
+        </p:spPr>
+      </p:pic>
     </p:spTree>
     <p:extLst>
       <p:ext uri="{BB962C8B-B14F-4D97-AF65-F5344CB8AC3E}">
-        <p14:creationId xmlns:p14="http://schemas.microsoft.com/office/powerpoint/2010/main" val="2639390587"/>
+        <p14:creationId xmlns:p14="http://schemas.microsoft.com/office/powerpoint/2010/main" val="3955841083"/>
       </p:ext>
     </p:extLst>
   </p:cSld>
@@ -4845,12 +7662,167 @@
           <a:chExt cx="0" cy="0"/>
         </a:xfrm>
       </p:grpSpPr>
+      <p:sp>
+        <p:nvSpPr>
+          <p:cNvPr id="2" name="Titolo 1">
+            <a:extLst>
+              <a:ext uri="{FF2B5EF4-FFF2-40B4-BE49-F238E27FC236}">
+                <a16:creationId xmlns:a16="http://schemas.microsoft.com/office/drawing/2014/main" id="{08447835-2397-5A0A-DD75-19D695394AE5}"/>
+              </a:ext>
+            </a:extLst>
+          </p:cNvPr>
+          <p:cNvSpPr>
+            <a:spLocks noGrp="1"/>
+          </p:cNvSpPr>
+          <p:nvPr>
+            <p:ph type="title"/>
+          </p:nvPr>
+        </p:nvSpPr>
+        <p:spPr/>
+        <p:txBody>
+          <a:bodyPr/>
+          <a:lstStyle/>
+          <a:p>
+            <a:r>
+              <a:rPr lang="it-IT" dirty="0"/>
+              <a:t>Esempio: applicazione di </a:t>
+            </a:r>
+            <a:r>
+              <a:rPr lang="it-IT" cap="small" dirty="0" err="1"/>
+              <a:t>prioritzr</a:t>
+            </a:r>
+            <a:r>
+              <a:rPr lang="it-IT" dirty="0"/>
+              <a:t> all’area pilota </a:t>
+            </a:r>
+            <a:r>
+              <a:rPr lang="it-IT" dirty="0" err="1"/>
+              <a:t>Strait</a:t>
+            </a:r>
+            <a:r>
+              <a:rPr lang="it-IT" dirty="0"/>
+              <a:t> of </a:t>
+            </a:r>
+            <a:r>
+              <a:rPr lang="it-IT" dirty="0" err="1"/>
+              <a:t>Sicily</a:t>
+            </a:r>
+            <a:r>
+              <a:rPr lang="it-IT" dirty="0"/>
+              <a:t> (</a:t>
+            </a:r>
+            <a:r>
+              <a:rPr lang="it-IT" dirty="0" err="1"/>
+              <a:t>SoS</a:t>
+            </a:r>
+            <a:r>
+              <a:rPr lang="it-IT" dirty="0"/>
+              <a:t>)</a:t>
+            </a:r>
+          </a:p>
+        </p:txBody>
+      </p:sp>
+      <p:sp>
+        <p:nvSpPr>
+          <p:cNvPr id="3" name="Segnaposto contenuto 2">
+            <a:extLst>
+              <a:ext uri="{FF2B5EF4-FFF2-40B4-BE49-F238E27FC236}">
+                <a16:creationId xmlns:a16="http://schemas.microsoft.com/office/drawing/2014/main" id="{8A15D1A8-12A4-C4CC-D310-5FC82050F380}"/>
+              </a:ext>
+            </a:extLst>
+          </p:cNvPr>
+          <p:cNvSpPr>
+            <a:spLocks noGrp="1"/>
+          </p:cNvSpPr>
+          <p:nvPr>
+            <p:ph idx="1"/>
+          </p:nvPr>
+        </p:nvSpPr>
+        <p:spPr>
+          <a:xfrm>
+            <a:off x="838200" y="2077375"/>
+            <a:ext cx="5477759" cy="4099588"/>
+          </a:xfrm>
+        </p:spPr>
+        <p:txBody>
+          <a:bodyPr>
+            <a:noAutofit/>
+          </a:bodyPr>
+          <a:lstStyle/>
+          <a:p>
+            <a:r>
+              <a:rPr lang="it-IT" sz="2400" dirty="0"/>
+              <a:t>Suddivisione in </a:t>
+            </a:r>
+            <a:r>
+              <a:rPr lang="it-IT" sz="2400" i="1" dirty="0"/>
+              <a:t>planning </a:t>
+            </a:r>
+            <a:r>
+              <a:rPr lang="it-IT" sz="2400" i="1" dirty="0" err="1"/>
+              <a:t>units</a:t>
+            </a:r>
+            <a:r>
+              <a:rPr lang="it-IT" sz="2400" dirty="0"/>
+              <a:t> quadrate (ma possibili </a:t>
+            </a:r>
+            <a:r>
+              <a:rPr lang="it-IT" sz="2400" dirty="0" err="1"/>
+              <a:t>PUs</a:t>
+            </a:r>
+            <a:r>
+              <a:rPr lang="it-IT" sz="2400" dirty="0"/>
+              <a:t> di qualsiasi forma e area)</a:t>
+            </a:r>
+          </a:p>
+          <a:p>
+            <a:r>
+              <a:rPr lang="it-IT" sz="2400" dirty="0"/>
+              <a:t>Costi di conservazione: costo-opportunità per attività di pesca (commerciale e non) e acquacoltura (</a:t>
+            </a:r>
+            <a:r>
+              <a:rPr lang="it-IT" sz="2400" dirty="0" err="1"/>
+              <a:t>Mazor</a:t>
+            </a:r>
+            <a:r>
+              <a:rPr lang="it-IT" sz="2400" dirty="0"/>
+              <a:t>, Giakoumi </a:t>
+            </a:r>
+            <a:r>
+              <a:rPr lang="it-IT" sz="2400" i="1" dirty="0"/>
+              <a:t>et al.</a:t>
+            </a:r>
+            <a:r>
+              <a:rPr lang="it-IT" sz="2400" dirty="0"/>
+              <a:t> 2014)</a:t>
+            </a:r>
+          </a:p>
+          <a:p>
+            <a:r>
+              <a:rPr lang="it-IT" sz="2400" dirty="0" err="1"/>
+              <a:t>Conservation</a:t>
+            </a:r>
+            <a:r>
+              <a:rPr lang="it-IT" sz="2400" dirty="0"/>
+              <a:t> features: 635 pesci Mediterranei (Albouy </a:t>
+            </a:r>
+            <a:r>
+              <a:rPr lang="it-IT" sz="2400" i="1" dirty="0"/>
+              <a:t>et al.</a:t>
+            </a:r>
+            <a:r>
+              <a:rPr lang="it-IT" sz="2400" dirty="0"/>
+              <a:t> 2015), di cui 398 presenti nell’area di studio</a:t>
+            </a:r>
+          </a:p>
+        </p:txBody>
+      </p:sp>
       <p:pic>
         <p:nvPicPr>
-          <p:cNvPr id="4" name="Immagine 3">
-            <a:extLst>
-              <a:ext uri="{FF2B5EF4-FFF2-40B4-BE49-F238E27FC236}">
-                <a16:creationId xmlns:a16="http://schemas.microsoft.com/office/drawing/2014/main" id="{FC1B0B62-19DD-0571-FFB3-94BA68B5E1D4}"/>
+          <p:cNvPr id="5" name="Immagine 4">
+            <a:extLst>
+              <a:ext uri="{FF2B5EF4-FFF2-40B4-BE49-F238E27FC236}">
+                <a16:creationId xmlns:a16="http://schemas.microsoft.com/office/drawing/2014/main" id="{59E86EDB-195A-ADBC-337B-AC3675C2F82B}"/>
               </a:ext>
             </a:extLst>
           </p:cNvPr>
@@ -4859,16 +7831,15 @@
           </p:cNvPicPr>
           <p:nvPr/>
         </p:nvPicPr>
-        <p:blipFill>
+        <p:blipFill rotWithShape="1">
           <a:blip r:embed="rId2"/>
-          <a:stretch>
-            <a:fillRect/>
-          </a:stretch>
+          <a:srcRect r="15747"/>
+          <a:stretch/>
         </p:blipFill>
         <p:spPr>
           <a:xfrm>
-            <a:off x="2938462" y="804862"/>
-            <a:ext cx="6315075" cy="5248275"/>
+            <a:off x="6399965" y="1954827"/>
+            <a:ext cx="5686160" cy="4313998"/>
           </a:xfrm>
           <a:prstGeom prst="rect">
             <a:avLst/>
@@ -4878,7 +7849,7 @@
     </p:spTree>
     <p:extLst>
       <p:ext uri="{BB962C8B-B14F-4D97-AF65-F5344CB8AC3E}">
-        <p14:creationId xmlns:p14="http://schemas.microsoft.com/office/powerpoint/2010/main" val="1179821706"/>
+        <p14:creationId xmlns:p14="http://schemas.microsoft.com/office/powerpoint/2010/main" val="1036781171"/>
       </p:ext>
     </p:extLst>
   </p:cSld>
@@ -4905,40 +7876,83 @@
           <a:chExt cx="0" cy="0"/>
         </a:xfrm>
       </p:grpSpPr>
-      <p:pic>
-        <p:nvPicPr>
-          <p:cNvPr id="4" name="Immagine 3">
-            <a:extLst>
-              <a:ext uri="{FF2B5EF4-FFF2-40B4-BE49-F238E27FC236}">
-                <a16:creationId xmlns:a16="http://schemas.microsoft.com/office/drawing/2014/main" id="{1225DB1F-BABA-EF3B-E12E-74B152304C95}"/>
-              </a:ext>
-            </a:extLst>
-          </p:cNvPr>
-          <p:cNvPicPr>
-            <a:picLocks noChangeAspect="1"/>
-          </p:cNvPicPr>
-          <p:nvPr/>
-        </p:nvPicPr>
-        <p:blipFill>
-          <a:blip r:embed="rId2"/>
-          <a:stretch>
-            <a:fillRect/>
-          </a:stretch>
-        </p:blipFill>
-        <p:spPr>
-          <a:xfrm>
-            <a:off x="2938462" y="804862"/>
-            <a:ext cx="6315075" cy="5248275"/>
-          </a:xfrm>
-          <a:prstGeom prst="rect">
-            <a:avLst/>
-          </a:prstGeom>
-        </p:spPr>
-      </p:pic>
+      <p:sp>
+        <p:nvSpPr>
+          <p:cNvPr id="3" name="Segnaposto contenuto 2">
+            <a:extLst>
+              <a:ext uri="{FF2B5EF4-FFF2-40B4-BE49-F238E27FC236}">
+                <a16:creationId xmlns:a16="http://schemas.microsoft.com/office/drawing/2014/main" id="{99D23324-316C-0525-9A6E-FE2073FEF1A5}"/>
+              </a:ext>
+            </a:extLst>
+          </p:cNvPr>
+          <p:cNvSpPr>
+            <a:spLocks noGrp="1"/>
+          </p:cNvSpPr>
+          <p:nvPr>
+            <p:ph idx="1"/>
+          </p:nvPr>
+        </p:nvSpPr>
+        <p:spPr>
+          <a:xfrm>
+            <a:off x="838200" y="372862"/>
+            <a:ext cx="10515600" cy="2737983"/>
+          </a:xfrm>
+        </p:spPr>
+        <p:txBody>
+          <a:bodyPr>
+            <a:normAutofit lnSpcReduction="10000"/>
+          </a:bodyPr>
+          <a:lstStyle/>
+          <a:p>
+            <a:r>
+              <a:rPr lang="it-IT" dirty="0"/>
+              <a:t>Obiettivo: minimizzare costo totale di conservazione («minimum set» </a:t>
+            </a:r>
+            <a:r>
+              <a:rPr lang="it-IT" dirty="0" err="1"/>
+              <a:t>problem</a:t>
+            </a:r>
+            <a:r>
+              <a:rPr lang="it-IT" dirty="0"/>
+              <a:t>)</a:t>
+            </a:r>
+          </a:p>
+          <a:p>
+            <a:r>
+              <a:rPr lang="it-IT" dirty="0"/>
+              <a:t>Vincoli: includere almeno una porzione minima (</a:t>
+            </a:r>
+            <a:r>
+              <a:rPr lang="it-IT" i="1" dirty="0"/>
+              <a:t>target</a:t>
+            </a:r>
+            <a:r>
+              <a:rPr lang="it-IT" dirty="0"/>
+              <a:t>) dell’areale di presenza di ogni specie:</a:t>
+            </a:r>
+          </a:p>
+          <a:p>
+            <a:pPr lvl="1"/>
+            <a:r>
+              <a:rPr lang="it-IT" dirty="0"/>
+              <a:t>target unico = 20%</a:t>
+            </a:r>
+          </a:p>
+          <a:p>
+            <a:pPr marL="457200" lvl="1" indent="0">
+              <a:buNone/>
+            </a:pPr>
+            <a:br>
+              <a:rPr lang="it-IT" dirty="0"/>
+            </a:br>
+            <a:endParaRPr lang="it-IT" dirty="0"/>
+          </a:p>
+        </p:txBody>
+      </p:sp>
     </p:spTree>
     <p:extLst>
       <p:ext uri="{BB962C8B-B14F-4D97-AF65-F5344CB8AC3E}">
-        <p14:creationId xmlns:p14="http://schemas.microsoft.com/office/powerpoint/2010/main" val="1776026556"/>
+        <p14:creationId xmlns:p14="http://schemas.microsoft.com/office/powerpoint/2010/main" val="2602557586"/>
       </p:ext>
     </p:extLst>
   </p:cSld>

</xml_diff>